<commit_message>
updated figure 4; still need to update fig5
</commit_message>
<xml_diff>
--- a/figures/fig4/fig4.pptx
+++ b/figures/fig4/fig4.pptx
@@ -5,11 +5,12 @@
     <p:sldMasterId id="2147483648" r:id="rId1"/>
   </p:sldMasterIdLst>
   <p:notesMasterIdLst>
-    <p:notesMasterId r:id="rId4"/>
+    <p:notesMasterId r:id="rId5"/>
   </p:notesMasterIdLst>
   <p:sldIdLst>
     <p:sldId id="256" r:id="rId2"/>
-    <p:sldId id="257" r:id="rId3"/>
+    <p:sldId id="258" r:id="rId3"/>
+    <p:sldId id="257" r:id="rId4"/>
   </p:sldIdLst>
   <p:sldSz cx="36576000" cy="32918400"/>
   <p:notesSz cx="7010400" cy="9296400"/>
@@ -1630,6 +1631,215 @@
         </p:txBody>
       </p:sp>
     </p:spTree>
+  </p:cSld>
+  <p:clrMapOvr>
+    <a:masterClrMapping/>
+  </p:clrMapOvr>
+</p:notes>
+</file>
+
+<file path=ppt/notesSlides/notesSlide2.xml><?xml version="1.0" encoding="utf-8"?>
+<p:notes xmlns:a="http://schemas.openxmlformats.org/drawingml/2006/main" xmlns:r="http://schemas.openxmlformats.org/officeDocument/2006/relationships" xmlns:p="http://schemas.openxmlformats.org/presentationml/2006/main" showMasterSp="0" showMasterPhAnim="0">
+  <p:cSld>
+    <p:spTree>
+      <p:nvGrpSpPr>
+        <p:cNvPr id="1" name="Shape 84">
+          <a:extLst>
+            <a:ext uri="{FF2B5EF4-FFF2-40B4-BE49-F238E27FC236}">
+              <a16:creationId xmlns:a16="http://schemas.microsoft.com/office/drawing/2014/main" id="{B67DD2D5-3B27-AA2F-7ADD-9EE69423159A}"/>
+            </a:ext>
+          </a:extLst>
+        </p:cNvPr>
+        <p:cNvGrpSpPr/>
+        <p:nvPr/>
+      </p:nvGrpSpPr>
+      <p:grpSpPr>
+        <a:xfrm>
+          <a:off x="0" y="0"/>
+          <a:ext cx="0" cy="0"/>
+          <a:chOff x="0" y="0"/>
+          <a:chExt cx="0" cy="0"/>
+        </a:xfrm>
+      </p:grpSpPr>
+      <p:sp>
+        <p:nvSpPr>
+          <p:cNvPr id="85" name="Google Shape;85;p1:notes">
+            <a:extLst>
+              <a:ext uri="{FF2B5EF4-FFF2-40B4-BE49-F238E27FC236}">
+                <a16:creationId xmlns:a16="http://schemas.microsoft.com/office/drawing/2014/main" id="{5BD78AC3-3EA2-2ABB-1804-6BF899618E75}"/>
+              </a:ext>
+            </a:extLst>
+          </p:cNvPr>
+          <p:cNvSpPr>
+            <a:spLocks noGrp="1" noRot="1" noChangeAspect="1"/>
+          </p:cNvSpPr>
+          <p:nvPr>
+            <p:ph type="sldImg" idx="2"/>
+          </p:nvPr>
+        </p:nvSpPr>
+        <p:spPr>
+          <a:xfrm>
+            <a:off x="1568450" y="696913"/>
+            <a:ext cx="3873500" cy="3486150"/>
+          </a:xfrm>
+          <a:custGeom>
+            <a:avLst/>
+            <a:gdLst/>
+            <a:ahLst/>
+            <a:cxnLst/>
+            <a:rect l="l" t="t" r="r" b="b"/>
+            <a:pathLst>
+              <a:path w="120000" h="120000" extrusionOk="0">
+                <a:moveTo>
+                  <a:pt x="0" y="0"/>
+                </a:moveTo>
+                <a:lnTo>
+                  <a:pt x="120000" y="0"/>
+                </a:lnTo>
+                <a:lnTo>
+                  <a:pt x="120000" y="120000"/>
+                </a:lnTo>
+                <a:lnTo>
+                  <a:pt x="0" y="120000"/>
+                </a:lnTo>
+                <a:close/>
+              </a:path>
+            </a:pathLst>
+          </a:custGeom>
+          <a:noFill/>
+          <a:ln w="9525" cap="flat" cmpd="sng">
+            <a:solidFill>
+              <a:srgbClr val="000000"/>
+            </a:solidFill>
+            <a:prstDash val="solid"/>
+            <a:miter lim="800000"/>
+            <a:headEnd type="none" w="sm" len="sm"/>
+            <a:tailEnd type="none" w="sm" len="sm"/>
+          </a:ln>
+        </p:spPr>
+      </p:sp>
+      <p:sp>
+        <p:nvSpPr>
+          <p:cNvPr id="86" name="Google Shape;86;p1:notes">
+            <a:extLst>
+              <a:ext uri="{FF2B5EF4-FFF2-40B4-BE49-F238E27FC236}">
+                <a16:creationId xmlns:a16="http://schemas.microsoft.com/office/drawing/2014/main" id="{469FB9AD-E58E-824E-C210-6C17AE138DB7}"/>
+              </a:ext>
+            </a:extLst>
+          </p:cNvPr>
+          <p:cNvSpPr txBox="1">
+            <a:spLocks noGrp="1"/>
+          </p:cNvSpPr>
+          <p:nvPr>
+            <p:ph type="body" idx="1"/>
+          </p:nvPr>
+        </p:nvSpPr>
+        <p:spPr>
+          <a:xfrm>
+            <a:off x="701675" y="4416425"/>
+            <a:ext cx="5607050" cy="4183063"/>
+          </a:xfrm>
+          <a:prstGeom prst="rect">
+            <a:avLst/>
+          </a:prstGeom>
+          <a:noFill/>
+          <a:ln>
+            <a:noFill/>
+          </a:ln>
+        </p:spPr>
+        <p:txBody>
+          <a:bodyPr spcFirstLastPara="1" wrap="square" lIns="93150" tIns="46575" rIns="93150" bIns="46575" anchor="t" anchorCtr="0">
+            <a:noAutofit/>
+          </a:bodyPr>
+          <a:lstStyle/>
+          <a:p>
+            <a:pPr marL="0" lvl="0" indent="0" algn="l" rtl="0">
+              <a:spcBef>
+                <a:spcPts val="0"/>
+              </a:spcBef>
+              <a:spcAft>
+                <a:spcPts val="0"/>
+              </a:spcAft>
+              <a:buNone/>
+            </a:pPr>
+            <a:endParaRPr dirty="0"/>
+          </a:p>
+        </p:txBody>
+      </p:sp>
+      <p:sp>
+        <p:nvSpPr>
+          <p:cNvPr id="87" name="Google Shape;87;p1:notes">
+            <a:extLst>
+              <a:ext uri="{FF2B5EF4-FFF2-40B4-BE49-F238E27FC236}">
+                <a16:creationId xmlns:a16="http://schemas.microsoft.com/office/drawing/2014/main" id="{665DED0C-D591-C8E2-59DC-55107135CE3D}"/>
+              </a:ext>
+            </a:extLst>
+          </p:cNvPr>
+          <p:cNvSpPr txBox="1">
+            <a:spLocks noGrp="1"/>
+          </p:cNvSpPr>
+          <p:nvPr>
+            <p:ph type="sldNum" idx="12"/>
+          </p:nvPr>
+        </p:nvSpPr>
+        <p:spPr>
+          <a:xfrm>
+            <a:off x="3970338" y="8829675"/>
+            <a:ext cx="3038475" cy="465138"/>
+          </a:xfrm>
+          <a:prstGeom prst="rect">
+            <a:avLst/>
+          </a:prstGeom>
+          <a:noFill/>
+          <a:ln>
+            <a:noFill/>
+          </a:ln>
+        </p:spPr>
+        <p:txBody>
+          <a:bodyPr spcFirstLastPara="1" wrap="square" lIns="93150" tIns="46575" rIns="93150" bIns="46575" anchor="b" anchorCtr="0">
+            <a:noAutofit/>
+          </a:bodyPr>
+          <a:lstStyle/>
+          <a:p>
+            <a:pPr marL="0" marR="0" lvl="0" indent="0" algn="r" rtl="0">
+              <a:spcBef>
+                <a:spcPts val="0"/>
+              </a:spcBef>
+              <a:spcAft>
+                <a:spcPts val="0"/>
+              </a:spcAft>
+              <a:buNone/>
+            </a:pPr>
+            <a:fld id="{00000000-1234-1234-1234-123412341234}" type="slidenum">
+              <a:rPr lang="en-US" sz="1200" b="0" i="0" u="none" strike="noStrike" cap="none">
+                <a:solidFill>
+                  <a:schemeClr val="dk1"/>
+                </a:solidFill>
+                <a:latin typeface="Calibri"/>
+                <a:ea typeface="Calibri"/>
+                <a:cs typeface="Calibri"/>
+                <a:sym typeface="Calibri"/>
+              </a:rPr>
+              <a:t>2</a:t>
+            </a:fld>
+            <a:endParaRPr sz="1200" b="0" i="0" u="none" strike="noStrike" cap="none">
+              <a:solidFill>
+                <a:schemeClr val="dk1"/>
+              </a:solidFill>
+              <a:latin typeface="Calibri"/>
+              <a:ea typeface="Calibri"/>
+              <a:cs typeface="Calibri"/>
+              <a:sym typeface="Calibri"/>
+            </a:endParaRPr>
+          </a:p>
+        </p:txBody>
+      </p:sp>
+    </p:spTree>
+    <p:extLst>
+      <p:ext uri="{BB962C8B-B14F-4D97-AF65-F5344CB8AC3E}">
+        <p14:creationId xmlns:p14="http://schemas.microsoft.com/office/powerpoint/2010/main" val="3711850135"/>
+      </p:ext>
+    </p:extLst>
   </p:cSld>
   <p:clrMapOvr>
     <a:masterClrMapping/>
@@ -11799,10 +12009,10 @@
       </p:grpSpPr>
       <p:pic>
         <p:nvPicPr>
-          <p:cNvPr id="14" name="Graphic 13">
+          <p:cNvPr id="185" name="Graphic 184" descr="Checkmark with solid fill">
             <a:extLst>
               <a:ext uri="{FF2B5EF4-FFF2-40B4-BE49-F238E27FC236}">
-                <a16:creationId xmlns:a16="http://schemas.microsoft.com/office/drawing/2014/main" id="{1FB58FE2-B391-3FB6-1618-C75B5B591EA5}"/>
+                <a16:creationId xmlns:a16="http://schemas.microsoft.com/office/drawing/2014/main" id="{DCA27A5C-FBBE-5048-B662-459BE66B6EC3}"/>
               </a:ext>
             </a:extLst>
           </p:cNvPr>
@@ -11819,15 +12029,14 @@
               </a:ext>
             </a:extLst>
           </a:blip>
-          <a:srcRect t="15349" r="4405" b="13774"/>
           <a:stretch>
             <a:fillRect/>
           </a:stretch>
         </p:blipFill>
         <p:spPr>
           <a:xfrm>
-            <a:off x="2084188" y="9555481"/>
-            <a:ext cx="33668852" cy="17830800"/>
+            <a:off x="1494535" y="11314090"/>
+            <a:ext cx="1480101" cy="1507512"/>
           </a:xfrm>
           <a:prstGeom prst="rect">
             <a:avLst/>
@@ -11836,10 +12045,10 @@
       </p:pic>
       <p:pic>
         <p:nvPicPr>
-          <p:cNvPr id="185" name="Graphic 184" descr="Checkmark with solid fill">
+          <p:cNvPr id="188" name="Graphic 187" descr="Close with solid fill">
             <a:extLst>
               <a:ext uri="{FF2B5EF4-FFF2-40B4-BE49-F238E27FC236}">
-                <a16:creationId xmlns:a16="http://schemas.microsoft.com/office/drawing/2014/main" id="{DCA27A5C-FBBE-5048-B662-459BE66B6EC3}"/>
+                <a16:creationId xmlns:a16="http://schemas.microsoft.com/office/drawing/2014/main" id="{779FDD90-9EAF-BCDA-F31C-068DD154F1C2}"/>
               </a:ext>
             </a:extLst>
           </p:cNvPr>
@@ -11862,8 +12071,8 @@
         </p:blipFill>
         <p:spPr>
           <a:xfrm>
-            <a:off x="880127" y="12171295"/>
-            <a:ext cx="957278" cy="975005"/>
+            <a:off x="1497119" y="9012553"/>
+            <a:ext cx="1480101" cy="1507512"/>
           </a:xfrm>
           <a:prstGeom prst="rect">
             <a:avLst/>
@@ -11872,10 +12081,118 @@
       </p:pic>
       <p:pic>
         <p:nvPicPr>
-          <p:cNvPr id="186" name="Graphic 185" descr="Close with solid fill">
+          <p:cNvPr id="191" name="Graphic 190" descr="Checkmark with solid fill">
             <a:extLst>
               <a:ext uri="{FF2B5EF4-FFF2-40B4-BE49-F238E27FC236}">
-                <a16:creationId xmlns:a16="http://schemas.microsoft.com/office/drawing/2014/main" id="{9CF423A5-3B5C-6831-87A1-8518A3063BE5}"/>
+                <a16:creationId xmlns:a16="http://schemas.microsoft.com/office/drawing/2014/main" id="{45B2AA1C-2005-7495-C00B-187ADC42C46F}"/>
+              </a:ext>
+            </a:extLst>
+          </p:cNvPr>
+          <p:cNvPicPr>
+            <a:picLocks noChangeAspect="1"/>
+          </p:cNvPicPr>
+          <p:nvPr/>
+        </p:nvPicPr>
+        <p:blipFill>
+          <a:blip r:embed="rId3">
+            <a:extLst>
+              <a:ext uri="{96DAC541-7B7A-43D3-8B79-37D633B846F1}">
+                <asvg:svgBlip xmlns:asvg="http://schemas.microsoft.com/office/drawing/2016/SVG/main" r:embed="rId4"/>
+              </a:ext>
+            </a:extLst>
+          </a:blip>
+          <a:stretch>
+            <a:fillRect/>
+          </a:stretch>
+        </p:blipFill>
+        <p:spPr>
+          <a:xfrm>
+            <a:off x="1496124" y="20491322"/>
+            <a:ext cx="1480101" cy="1507512"/>
+          </a:xfrm>
+          <a:prstGeom prst="rect">
+            <a:avLst/>
+          </a:prstGeom>
+        </p:spPr>
+      </p:pic>
+      <p:pic>
+        <p:nvPicPr>
+          <p:cNvPr id="198" name="Graphic 197" descr="Checkmark with solid fill">
+            <a:extLst>
+              <a:ext uri="{FF2B5EF4-FFF2-40B4-BE49-F238E27FC236}">
+                <a16:creationId xmlns:a16="http://schemas.microsoft.com/office/drawing/2014/main" id="{36980361-4218-5E26-8269-F3A9CB31A788}"/>
+              </a:ext>
+            </a:extLst>
+          </p:cNvPr>
+          <p:cNvPicPr>
+            <a:picLocks noChangeAspect="1"/>
+          </p:cNvPicPr>
+          <p:nvPr/>
+        </p:nvPicPr>
+        <p:blipFill>
+          <a:blip r:embed="rId3">
+            <a:extLst>
+              <a:ext uri="{96DAC541-7B7A-43D3-8B79-37D633B846F1}">
+                <asvg:svgBlip xmlns:asvg="http://schemas.microsoft.com/office/drawing/2016/SVG/main" r:embed="rId4"/>
+              </a:ext>
+            </a:extLst>
+          </a:blip>
+          <a:stretch>
+            <a:fillRect/>
+          </a:stretch>
+        </p:blipFill>
+        <p:spPr>
+          <a:xfrm>
+            <a:off x="1496123" y="25083427"/>
+            <a:ext cx="1480101" cy="1507512"/>
+          </a:xfrm>
+          <a:prstGeom prst="rect">
+            <a:avLst/>
+          </a:prstGeom>
+        </p:spPr>
+      </p:pic>
+      <p:pic>
+        <p:nvPicPr>
+          <p:cNvPr id="199" name="Graphic 198" descr="Checkmark with solid fill">
+            <a:extLst>
+              <a:ext uri="{FF2B5EF4-FFF2-40B4-BE49-F238E27FC236}">
+                <a16:creationId xmlns:a16="http://schemas.microsoft.com/office/drawing/2014/main" id="{58C350FE-7A57-656E-8C30-D3586FB310A7}"/>
+              </a:ext>
+            </a:extLst>
+          </p:cNvPr>
+          <p:cNvPicPr>
+            <a:picLocks noChangeAspect="1"/>
+          </p:cNvPicPr>
+          <p:nvPr/>
+        </p:nvPicPr>
+        <p:blipFill>
+          <a:blip r:embed="rId3">
+            <a:extLst>
+              <a:ext uri="{96DAC541-7B7A-43D3-8B79-37D633B846F1}">
+                <asvg:svgBlip xmlns:asvg="http://schemas.microsoft.com/office/drawing/2016/SVG/main" r:embed="rId4"/>
+              </a:ext>
+            </a:extLst>
+          </a:blip>
+          <a:stretch>
+            <a:fillRect/>
+          </a:stretch>
+        </p:blipFill>
+        <p:spPr>
+          <a:xfrm>
+            <a:off x="1494535" y="15901912"/>
+            <a:ext cx="1480101" cy="1507512"/>
+          </a:xfrm>
+          <a:prstGeom prst="rect">
+            <a:avLst/>
+          </a:prstGeom>
+        </p:spPr>
+      </p:pic>
+      <p:pic>
+        <p:nvPicPr>
+          <p:cNvPr id="3" name="Graphic 2">
+            <a:extLst>
+              <a:ext uri="{FF2B5EF4-FFF2-40B4-BE49-F238E27FC236}">
+                <a16:creationId xmlns:a16="http://schemas.microsoft.com/office/drawing/2014/main" id="{47E1DC43-5DA3-C19F-30EB-DD4237D24563}"/>
               </a:ext>
             </a:extLst>
           </p:cNvPr>
@@ -11898,158 +12215,290 @@
         </p:blipFill>
         <p:spPr>
           <a:xfrm>
-            <a:off x="2021676" y="21749205"/>
-            <a:ext cx="957278" cy="975005"/>
+            <a:off x="3197626" y="4936512"/>
+            <a:ext cx="38696636" cy="28069259"/>
           </a:xfrm>
           <a:prstGeom prst="rect">
             <a:avLst/>
           </a:prstGeom>
         </p:spPr>
       </p:pic>
-      <p:pic>
-        <p:nvPicPr>
-          <p:cNvPr id="188" name="Graphic 187" descr="Close with solid fill">
+      <p:sp>
+        <p:nvSpPr>
+          <p:cNvPr id="11" name="Rectangle 10">
             <a:extLst>
               <a:ext uri="{FF2B5EF4-FFF2-40B4-BE49-F238E27FC236}">
-                <a16:creationId xmlns:a16="http://schemas.microsoft.com/office/drawing/2014/main" id="{779FDD90-9EAF-BCDA-F31C-068DD154F1C2}"/>
+                <a16:creationId xmlns:a16="http://schemas.microsoft.com/office/drawing/2014/main" id="{D7AFB549-DED7-9E7B-017F-92154F80E819}"/>
               </a:ext>
             </a:extLst>
           </p:cNvPr>
-          <p:cNvPicPr>
-            <a:picLocks noChangeAspect="1"/>
-          </p:cNvPicPr>
+          <p:cNvSpPr/>
           <p:nvPr/>
-        </p:nvPicPr>
-        <p:blipFill>
-          <a:blip r:embed="rId7">
-            <a:extLst>
-              <a:ext uri="{96DAC541-7B7A-43D3-8B79-37D633B846F1}">
-                <asvg:svgBlip xmlns:asvg="http://schemas.microsoft.com/office/drawing/2016/SVG/main" r:embed="rId8"/>
-              </a:ext>
-            </a:extLst>
-          </a:blip>
-          <a:stretch>
-            <a:fillRect/>
-          </a:stretch>
-        </p:blipFill>
+        </p:nvSpPr>
         <p:spPr>
           <a:xfrm>
-            <a:off x="1215958" y="10804222"/>
-            <a:ext cx="957278" cy="975005"/>
+            <a:off x="-11297285" y="9744938"/>
+            <a:ext cx="61264800" cy="45719"/>
           </a:xfrm>
           <a:prstGeom prst="rect">
             <a:avLst/>
           </a:prstGeom>
         </p:spPr>
-      </p:pic>
-      <p:pic>
-        <p:nvPicPr>
-          <p:cNvPr id="191" name="Graphic 190" descr="Checkmark with solid fill">
+        <p:style>
+          <a:lnRef idx="2">
+            <a:schemeClr val="accent1">
+              <a:shade val="15000"/>
+            </a:schemeClr>
+          </a:lnRef>
+          <a:fillRef idx="1">
+            <a:schemeClr val="accent1"/>
+          </a:fillRef>
+          <a:effectRef idx="0">
+            <a:schemeClr val="accent1"/>
+          </a:effectRef>
+          <a:fontRef idx="minor">
+            <a:schemeClr val="lt1"/>
+          </a:fontRef>
+        </p:style>
+        <p:txBody>
+          <a:bodyPr rtlCol="0" anchor="ctr"/>
+          <a:lstStyle/>
+          <a:p>
+            <a:pPr algn="ctr"/>
+            <a:endParaRPr lang="en-US"/>
+          </a:p>
+        </p:txBody>
+      </p:sp>
+      <p:sp>
+        <p:nvSpPr>
+          <p:cNvPr id="12" name="Rectangle 11">
             <a:extLst>
               <a:ext uri="{FF2B5EF4-FFF2-40B4-BE49-F238E27FC236}">
-                <a16:creationId xmlns:a16="http://schemas.microsoft.com/office/drawing/2014/main" id="{45B2AA1C-2005-7495-C00B-187ADC42C46F}"/>
+                <a16:creationId xmlns:a16="http://schemas.microsoft.com/office/drawing/2014/main" id="{B8F115EB-4503-5B1D-62BE-8574AB839757}"/>
               </a:ext>
             </a:extLst>
           </p:cNvPr>
-          <p:cNvPicPr>
-            <a:picLocks noChangeAspect="1"/>
-          </p:cNvPicPr>
+          <p:cNvSpPr/>
           <p:nvPr/>
-        </p:nvPicPr>
-        <p:blipFill>
-          <a:blip r:embed="rId5">
-            <a:extLst>
-              <a:ext uri="{96DAC541-7B7A-43D3-8B79-37D633B846F1}">
-                <asvg:svgBlip xmlns:asvg="http://schemas.microsoft.com/office/drawing/2016/SVG/main" r:embed="rId6"/>
-              </a:ext>
-            </a:extLst>
-          </a:blip>
-          <a:stretch>
-            <a:fillRect/>
-          </a:stretch>
-        </p:blipFill>
+        </p:nvSpPr>
         <p:spPr>
           <a:xfrm>
-            <a:off x="3738898" y="20380430"/>
-            <a:ext cx="957278" cy="975005"/>
+            <a:off x="-11144885" y="12043638"/>
+            <a:ext cx="61264800" cy="45719"/>
           </a:xfrm>
           <a:prstGeom prst="rect">
             <a:avLst/>
           </a:prstGeom>
         </p:spPr>
-      </p:pic>
-      <p:pic>
-        <p:nvPicPr>
-          <p:cNvPr id="198" name="Graphic 197" descr="Checkmark with solid fill">
+        <p:style>
+          <a:lnRef idx="2">
+            <a:schemeClr val="accent1">
+              <a:shade val="15000"/>
+            </a:schemeClr>
+          </a:lnRef>
+          <a:fillRef idx="1">
+            <a:schemeClr val="accent1"/>
+          </a:fillRef>
+          <a:effectRef idx="0">
+            <a:schemeClr val="accent1"/>
+          </a:effectRef>
+          <a:fontRef idx="minor">
+            <a:schemeClr val="lt1"/>
+          </a:fontRef>
+        </p:style>
+        <p:txBody>
+          <a:bodyPr rtlCol="0" anchor="ctr"/>
+          <a:lstStyle/>
+          <a:p>
+            <a:pPr algn="ctr"/>
+            <a:endParaRPr lang="en-US"/>
+          </a:p>
+        </p:txBody>
+      </p:sp>
+      <p:sp>
+        <p:nvSpPr>
+          <p:cNvPr id="14" name="Rectangle 13">
             <a:extLst>
               <a:ext uri="{FF2B5EF4-FFF2-40B4-BE49-F238E27FC236}">
-                <a16:creationId xmlns:a16="http://schemas.microsoft.com/office/drawing/2014/main" id="{36980361-4218-5E26-8269-F3A9CB31A788}"/>
+                <a16:creationId xmlns:a16="http://schemas.microsoft.com/office/drawing/2014/main" id="{C966F85F-FAD5-7B87-1E3B-D8E37A1FF96D}"/>
               </a:ext>
             </a:extLst>
           </p:cNvPr>
-          <p:cNvPicPr>
-            <a:picLocks noChangeAspect="1"/>
-          </p:cNvPicPr>
+          <p:cNvSpPr/>
           <p:nvPr/>
-        </p:nvPicPr>
-        <p:blipFill>
-          <a:blip r:embed="rId5">
-            <a:extLst>
-              <a:ext uri="{96DAC541-7B7A-43D3-8B79-37D633B846F1}">
-                <asvg:svgBlip xmlns:asvg="http://schemas.microsoft.com/office/drawing/2016/SVG/main" r:embed="rId6"/>
-              </a:ext>
-            </a:extLst>
-          </a:blip>
-          <a:stretch>
-            <a:fillRect/>
-          </a:stretch>
-        </p:blipFill>
+        </p:nvSpPr>
         <p:spPr>
           <a:xfrm>
-            <a:off x="759598" y="17643304"/>
-            <a:ext cx="957278" cy="975005"/>
+            <a:off x="-10992485" y="16632846"/>
+            <a:ext cx="61264800" cy="45719"/>
           </a:xfrm>
           <a:prstGeom prst="rect">
             <a:avLst/>
           </a:prstGeom>
         </p:spPr>
-      </p:pic>
-      <p:pic>
-        <p:nvPicPr>
-          <p:cNvPr id="199" name="Graphic 198" descr="Checkmark with solid fill">
+        <p:style>
+          <a:lnRef idx="2">
+            <a:schemeClr val="accent1">
+              <a:shade val="15000"/>
+            </a:schemeClr>
+          </a:lnRef>
+          <a:fillRef idx="1">
+            <a:schemeClr val="accent1"/>
+          </a:fillRef>
+          <a:effectRef idx="0">
+            <a:schemeClr val="accent1"/>
+          </a:effectRef>
+          <a:fontRef idx="minor">
+            <a:schemeClr val="lt1"/>
+          </a:fontRef>
+        </p:style>
+        <p:txBody>
+          <a:bodyPr rtlCol="0" anchor="ctr"/>
+          <a:lstStyle/>
+          <a:p>
+            <a:pPr algn="ctr"/>
+            <a:endParaRPr lang="en-US"/>
+          </a:p>
+        </p:txBody>
+      </p:sp>
+      <p:sp>
+        <p:nvSpPr>
+          <p:cNvPr id="15" name="Rectangle 14">
             <a:extLst>
               <a:ext uri="{FF2B5EF4-FFF2-40B4-BE49-F238E27FC236}">
-                <a16:creationId xmlns:a16="http://schemas.microsoft.com/office/drawing/2014/main" id="{58C350FE-7A57-656E-8C30-D3586FB310A7}"/>
+                <a16:creationId xmlns:a16="http://schemas.microsoft.com/office/drawing/2014/main" id="{2DC73F40-A762-17C2-1F86-53A55D27526B}"/>
               </a:ext>
             </a:extLst>
           </p:cNvPr>
-          <p:cNvPicPr>
-            <a:picLocks noChangeAspect="1"/>
-          </p:cNvPicPr>
+          <p:cNvSpPr/>
           <p:nvPr/>
-        </p:nvPicPr>
-        <p:blipFill>
-          <a:blip r:embed="rId5">
-            <a:extLst>
-              <a:ext uri="{96DAC541-7B7A-43D3-8B79-37D633B846F1}">
-                <asvg:svgBlip xmlns:asvg="http://schemas.microsoft.com/office/drawing/2016/SVG/main" r:embed="rId6"/>
-              </a:ext>
-            </a:extLst>
-          </a:blip>
-          <a:stretch>
-            <a:fillRect/>
-          </a:stretch>
-        </p:blipFill>
+        </p:nvSpPr>
         <p:spPr>
           <a:xfrm>
-            <a:off x="869286" y="14909008"/>
-            <a:ext cx="957278" cy="975005"/>
+            <a:off x="-10840085" y="21222646"/>
+            <a:ext cx="61264800" cy="45719"/>
           </a:xfrm>
           <a:prstGeom prst="rect">
             <a:avLst/>
           </a:prstGeom>
         </p:spPr>
-      </p:pic>
+        <p:style>
+          <a:lnRef idx="2">
+            <a:schemeClr val="accent1">
+              <a:shade val="15000"/>
+            </a:schemeClr>
+          </a:lnRef>
+          <a:fillRef idx="1">
+            <a:schemeClr val="accent1"/>
+          </a:fillRef>
+          <a:effectRef idx="0">
+            <a:schemeClr val="accent1"/>
+          </a:effectRef>
+          <a:fontRef idx="minor">
+            <a:schemeClr val="lt1"/>
+          </a:fontRef>
+        </p:style>
+        <p:txBody>
+          <a:bodyPr rtlCol="0" anchor="ctr"/>
+          <a:lstStyle/>
+          <a:p>
+            <a:pPr algn="ctr"/>
+            <a:endParaRPr lang="en-US"/>
+          </a:p>
+        </p:txBody>
+      </p:sp>
+      <p:sp>
+        <p:nvSpPr>
+          <p:cNvPr id="16" name="Rectangle 15">
+            <a:extLst>
+              <a:ext uri="{FF2B5EF4-FFF2-40B4-BE49-F238E27FC236}">
+                <a16:creationId xmlns:a16="http://schemas.microsoft.com/office/drawing/2014/main" id="{81ECEBF2-33F7-F973-CA79-7934A75BB769}"/>
+              </a:ext>
+            </a:extLst>
+          </p:cNvPr>
+          <p:cNvSpPr/>
+          <p:nvPr/>
+        </p:nvSpPr>
+        <p:spPr>
+          <a:xfrm>
+            <a:off x="-10641965" y="25814324"/>
+            <a:ext cx="61264800" cy="45719"/>
+          </a:xfrm>
+          <a:prstGeom prst="rect">
+            <a:avLst/>
+          </a:prstGeom>
+        </p:spPr>
+        <p:style>
+          <a:lnRef idx="2">
+            <a:schemeClr val="accent1">
+              <a:shade val="15000"/>
+            </a:schemeClr>
+          </a:lnRef>
+          <a:fillRef idx="1">
+            <a:schemeClr val="accent1"/>
+          </a:fillRef>
+          <a:effectRef idx="0">
+            <a:schemeClr val="accent1"/>
+          </a:effectRef>
+          <a:fontRef idx="minor">
+            <a:schemeClr val="lt1"/>
+          </a:fontRef>
+        </p:style>
+        <p:txBody>
+          <a:bodyPr rtlCol="0" anchor="ctr"/>
+          <a:lstStyle/>
+          <a:p>
+            <a:pPr algn="ctr"/>
+            <a:endParaRPr lang="en-US"/>
+          </a:p>
+        </p:txBody>
+      </p:sp>
+      <p:sp>
+        <p:nvSpPr>
+          <p:cNvPr id="17" name="Rectangle 16">
+            <a:extLst>
+              <a:ext uri="{FF2B5EF4-FFF2-40B4-BE49-F238E27FC236}">
+                <a16:creationId xmlns:a16="http://schemas.microsoft.com/office/drawing/2014/main" id="{C5620718-9FB8-71F8-882A-F888C5B63882}"/>
+              </a:ext>
+            </a:extLst>
+          </p:cNvPr>
+          <p:cNvSpPr/>
+          <p:nvPr/>
+        </p:nvSpPr>
+        <p:spPr>
+          <a:xfrm>
+            <a:off x="3001295" y="6360047"/>
+            <a:ext cx="2825496" cy="32427996"/>
+          </a:xfrm>
+          <a:prstGeom prst="rect">
+            <a:avLst/>
+          </a:prstGeom>
+        </p:spPr>
+        <p:style>
+          <a:lnRef idx="2">
+            <a:schemeClr val="accent1">
+              <a:shade val="15000"/>
+            </a:schemeClr>
+          </a:lnRef>
+          <a:fillRef idx="1">
+            <a:schemeClr val="accent1"/>
+          </a:fillRef>
+          <a:effectRef idx="0">
+            <a:schemeClr val="accent1"/>
+          </a:effectRef>
+          <a:fontRef idx="minor">
+            <a:schemeClr val="lt1"/>
+          </a:fontRef>
+        </p:style>
+        <p:txBody>
+          <a:bodyPr rtlCol="0" anchor="ctr"/>
+          <a:lstStyle/>
+          <a:p>
+            <a:pPr algn="ctr"/>
+            <a:endParaRPr lang="en-US"/>
+          </a:p>
+        </p:txBody>
+      </p:sp>
     </p:spTree>
   </p:cSld>
   <p:clrMapOvr>
@@ -12059,6 +12508,288 @@
 </file>
 
 <file path=ppt/slides/slide2.xml><?xml version="1.0" encoding="utf-8"?>
+<p:sld xmlns:a="http://schemas.openxmlformats.org/drawingml/2006/main" xmlns:r="http://schemas.openxmlformats.org/officeDocument/2006/relationships" xmlns:p="http://schemas.openxmlformats.org/presentationml/2006/main">
+  <p:cSld>
+    <p:bg>
+      <p:bgPr>
+        <a:solidFill>
+          <a:schemeClr val="lt1"/>
+        </a:solidFill>
+        <a:effectLst/>
+      </p:bgPr>
+    </p:bg>
+    <p:spTree>
+      <p:nvGrpSpPr>
+        <p:cNvPr id="1" name="Shape 88">
+          <a:extLst>
+            <a:ext uri="{FF2B5EF4-FFF2-40B4-BE49-F238E27FC236}">
+              <a16:creationId xmlns:a16="http://schemas.microsoft.com/office/drawing/2014/main" id="{2001B2A7-E2F5-6F7A-A743-8D4017D1BAE1}"/>
+            </a:ext>
+          </a:extLst>
+        </p:cNvPr>
+        <p:cNvGrpSpPr/>
+        <p:nvPr/>
+      </p:nvGrpSpPr>
+      <p:grpSpPr>
+        <a:xfrm>
+          <a:off x="0" y="0"/>
+          <a:ext cx="0" cy="0"/>
+          <a:chOff x="0" y="0"/>
+          <a:chExt cx="0" cy="0"/>
+        </a:xfrm>
+      </p:grpSpPr>
+      <p:grpSp>
+        <p:nvGrpSpPr>
+          <p:cNvPr id="2" name="Group 1">
+            <a:extLst>
+              <a:ext uri="{FF2B5EF4-FFF2-40B4-BE49-F238E27FC236}">
+                <a16:creationId xmlns:a16="http://schemas.microsoft.com/office/drawing/2014/main" id="{9121A2DA-5A77-BEB9-01BE-4A6CF0143DF3}"/>
+              </a:ext>
+            </a:extLst>
+          </p:cNvPr>
+          <p:cNvGrpSpPr/>
+          <p:nvPr/>
+        </p:nvGrpSpPr>
+        <p:grpSpPr>
+          <a:xfrm>
+            <a:off x="688110" y="7903029"/>
+            <a:ext cx="35197415" cy="25690571"/>
+            <a:chOff x="1537196" y="4936512"/>
+            <a:chExt cx="38456341" cy="28069259"/>
+          </a:xfrm>
+        </p:grpSpPr>
+        <p:pic>
+          <p:nvPicPr>
+            <p:cNvPr id="185" name="Graphic 184" descr="Checkmark with solid fill">
+              <a:extLst>
+                <a:ext uri="{FF2B5EF4-FFF2-40B4-BE49-F238E27FC236}">
+                  <a16:creationId xmlns:a16="http://schemas.microsoft.com/office/drawing/2014/main" id="{5874451E-61CD-4822-7FFF-A23594B8D1BE}"/>
+                </a:ext>
+              </a:extLst>
+            </p:cNvPr>
+            <p:cNvPicPr>
+              <a:picLocks noChangeAspect="1"/>
+            </p:cNvPicPr>
+            <p:nvPr/>
+          </p:nvPicPr>
+          <p:blipFill>
+            <a:blip r:embed="rId3">
+              <a:extLst>
+                <a:ext uri="{96DAC541-7B7A-43D3-8B79-37D633B846F1}">
+                  <asvg:svgBlip xmlns:asvg="http://schemas.microsoft.com/office/drawing/2016/SVG/main" r:embed="rId4"/>
+                </a:ext>
+              </a:extLst>
+            </a:blip>
+            <a:stretch>
+              <a:fillRect/>
+            </a:stretch>
+          </p:blipFill>
+          <p:spPr>
+            <a:xfrm>
+              <a:off x="1537196" y="11357541"/>
+              <a:ext cx="1394780" cy="1420610"/>
+            </a:xfrm>
+            <a:prstGeom prst="rect">
+              <a:avLst/>
+            </a:prstGeom>
+          </p:spPr>
+        </p:pic>
+        <p:pic>
+          <p:nvPicPr>
+            <p:cNvPr id="188" name="Graphic 187" descr="Close with solid fill">
+              <a:extLst>
+                <a:ext uri="{FF2B5EF4-FFF2-40B4-BE49-F238E27FC236}">
+                  <a16:creationId xmlns:a16="http://schemas.microsoft.com/office/drawing/2014/main" id="{F38B9E66-69B9-124F-CC1E-9A44F23A5B94}"/>
+                </a:ext>
+              </a:extLst>
+            </p:cNvPr>
+            <p:cNvPicPr>
+              <a:picLocks noChangeAspect="1"/>
+            </p:cNvPicPr>
+            <p:nvPr/>
+          </p:nvPicPr>
+          <p:blipFill>
+            <a:blip r:embed="rId5">
+              <a:extLst>
+                <a:ext uri="{96DAC541-7B7A-43D3-8B79-37D633B846F1}">
+                  <asvg:svgBlip xmlns:asvg="http://schemas.microsoft.com/office/drawing/2016/SVG/main" r:embed="rId6"/>
+                </a:ext>
+              </a:extLst>
+            </a:blip>
+            <a:stretch>
+              <a:fillRect/>
+            </a:stretch>
+          </p:blipFill>
+          <p:spPr>
+            <a:xfrm>
+              <a:off x="1539780" y="9056004"/>
+              <a:ext cx="1394780" cy="1420610"/>
+            </a:xfrm>
+            <a:prstGeom prst="rect">
+              <a:avLst/>
+            </a:prstGeom>
+          </p:spPr>
+        </p:pic>
+        <p:pic>
+          <p:nvPicPr>
+            <p:cNvPr id="191" name="Graphic 190" descr="Checkmark with solid fill">
+              <a:extLst>
+                <a:ext uri="{FF2B5EF4-FFF2-40B4-BE49-F238E27FC236}">
+                  <a16:creationId xmlns:a16="http://schemas.microsoft.com/office/drawing/2014/main" id="{B7B86BC9-A459-7F7E-F26F-C739D08B72CB}"/>
+                </a:ext>
+              </a:extLst>
+            </p:cNvPr>
+            <p:cNvPicPr>
+              <a:picLocks noChangeAspect="1"/>
+            </p:cNvPicPr>
+            <p:nvPr/>
+          </p:nvPicPr>
+          <p:blipFill>
+            <a:blip r:embed="rId3">
+              <a:extLst>
+                <a:ext uri="{96DAC541-7B7A-43D3-8B79-37D633B846F1}">
+                  <asvg:svgBlip xmlns:asvg="http://schemas.microsoft.com/office/drawing/2016/SVG/main" r:embed="rId4"/>
+                </a:ext>
+              </a:extLst>
+            </a:blip>
+            <a:stretch>
+              <a:fillRect/>
+            </a:stretch>
+          </p:blipFill>
+          <p:spPr>
+            <a:xfrm>
+              <a:off x="1538785" y="20534773"/>
+              <a:ext cx="1394780" cy="1420610"/>
+            </a:xfrm>
+            <a:prstGeom prst="rect">
+              <a:avLst/>
+            </a:prstGeom>
+          </p:spPr>
+        </p:pic>
+        <p:pic>
+          <p:nvPicPr>
+            <p:cNvPr id="198" name="Graphic 197" descr="Checkmark with solid fill">
+              <a:extLst>
+                <a:ext uri="{FF2B5EF4-FFF2-40B4-BE49-F238E27FC236}">
+                  <a16:creationId xmlns:a16="http://schemas.microsoft.com/office/drawing/2014/main" id="{E146FDD4-EDD0-1DA7-52BF-AE4A793C6B6D}"/>
+                </a:ext>
+              </a:extLst>
+            </p:cNvPr>
+            <p:cNvPicPr>
+              <a:picLocks noChangeAspect="1"/>
+            </p:cNvPicPr>
+            <p:nvPr/>
+          </p:nvPicPr>
+          <p:blipFill>
+            <a:blip r:embed="rId3">
+              <a:extLst>
+                <a:ext uri="{96DAC541-7B7A-43D3-8B79-37D633B846F1}">
+                  <asvg:svgBlip xmlns:asvg="http://schemas.microsoft.com/office/drawing/2016/SVG/main" r:embed="rId4"/>
+                </a:ext>
+              </a:extLst>
+            </a:blip>
+            <a:stretch>
+              <a:fillRect/>
+            </a:stretch>
+          </p:blipFill>
+          <p:spPr>
+            <a:xfrm>
+              <a:off x="1538784" y="25126878"/>
+              <a:ext cx="1394780" cy="1420610"/>
+            </a:xfrm>
+            <a:prstGeom prst="rect">
+              <a:avLst/>
+            </a:prstGeom>
+          </p:spPr>
+        </p:pic>
+        <p:pic>
+          <p:nvPicPr>
+            <p:cNvPr id="199" name="Graphic 198" descr="Checkmark with solid fill">
+              <a:extLst>
+                <a:ext uri="{FF2B5EF4-FFF2-40B4-BE49-F238E27FC236}">
+                  <a16:creationId xmlns:a16="http://schemas.microsoft.com/office/drawing/2014/main" id="{D2295816-0CB7-DE5E-F362-07ED0A6CCF94}"/>
+                </a:ext>
+              </a:extLst>
+            </p:cNvPr>
+            <p:cNvPicPr>
+              <a:picLocks noChangeAspect="1"/>
+            </p:cNvPicPr>
+            <p:nvPr/>
+          </p:nvPicPr>
+          <p:blipFill>
+            <a:blip r:embed="rId3">
+              <a:extLst>
+                <a:ext uri="{96DAC541-7B7A-43D3-8B79-37D633B846F1}">
+                  <asvg:svgBlip xmlns:asvg="http://schemas.microsoft.com/office/drawing/2016/SVG/main" r:embed="rId4"/>
+                </a:ext>
+              </a:extLst>
+            </a:blip>
+            <a:stretch>
+              <a:fillRect/>
+            </a:stretch>
+          </p:blipFill>
+          <p:spPr>
+            <a:xfrm>
+              <a:off x="1537196" y="15945363"/>
+              <a:ext cx="1394780" cy="1420610"/>
+            </a:xfrm>
+            <a:prstGeom prst="rect">
+              <a:avLst/>
+            </a:prstGeom>
+          </p:spPr>
+        </p:pic>
+        <p:pic>
+          <p:nvPicPr>
+            <p:cNvPr id="3" name="Graphic 2">
+              <a:extLst>
+                <a:ext uri="{FF2B5EF4-FFF2-40B4-BE49-F238E27FC236}">
+                  <a16:creationId xmlns:a16="http://schemas.microsoft.com/office/drawing/2014/main" id="{ECBFC91F-3F11-852E-3A03-A691993AA7F2}"/>
+                </a:ext>
+              </a:extLst>
+            </p:cNvPr>
+            <p:cNvPicPr>
+              <a:picLocks noChangeAspect="1"/>
+            </p:cNvPicPr>
+            <p:nvPr/>
+          </p:nvPicPr>
+          <p:blipFill>
+            <a:blip r:embed="rId7">
+              <a:extLst>
+                <a:ext uri="{96DAC541-7B7A-43D3-8B79-37D633B846F1}">
+                  <asvg:svgBlip xmlns:asvg="http://schemas.microsoft.com/office/drawing/2016/SVG/main" r:embed="rId8"/>
+                </a:ext>
+              </a:extLst>
+            </a:blip>
+            <a:srcRect r="4743"/>
+            <a:stretch>
+              <a:fillRect/>
+            </a:stretch>
+          </p:blipFill>
+          <p:spPr>
+            <a:xfrm>
+              <a:off x="3132312" y="4936512"/>
+              <a:ext cx="36861225" cy="28069259"/>
+            </a:xfrm>
+            <a:prstGeom prst="rect">
+              <a:avLst/>
+            </a:prstGeom>
+          </p:spPr>
+        </p:pic>
+      </p:grpSp>
+    </p:spTree>
+    <p:extLst>
+      <p:ext uri="{BB962C8B-B14F-4D97-AF65-F5344CB8AC3E}">
+        <p14:creationId xmlns:p14="http://schemas.microsoft.com/office/powerpoint/2010/main" val="1513626308"/>
+      </p:ext>
+    </p:extLst>
+  </p:cSld>
+  <p:clrMapOvr>
+    <a:masterClrMapping/>
+  </p:clrMapOvr>
+</p:sld>
+</file>
+
+<file path=ppt/slides/slide3.xml><?xml version="1.0" encoding="utf-8"?>
 <p:sld xmlns:a="http://schemas.openxmlformats.org/drawingml/2006/main" xmlns:r="http://schemas.openxmlformats.org/officeDocument/2006/relationships" xmlns:p="http://schemas.openxmlformats.org/presentationml/2006/main">
   <p:cSld>
     <p:spTree>
@@ -12080,7 +12811,7 @@
           <p:cNvPr id="3" name="Graphic 2">
             <a:extLst>
               <a:ext uri="{FF2B5EF4-FFF2-40B4-BE49-F238E27FC236}">
-                <a16:creationId xmlns:a16="http://schemas.microsoft.com/office/drawing/2014/main" id="{CAAC8B2B-0D5C-0907-3FAF-DE1F54A73F16}"/>
+                <a16:creationId xmlns:a16="http://schemas.microsoft.com/office/drawing/2014/main" id="{4AA91E08-3059-5CD6-3148-47A2546A227C}"/>
               </a:ext>
             </a:extLst>
           </p:cNvPr>
@@ -12097,15 +12828,15 @@
               </a:ext>
             </a:extLst>
           </a:blip>
-          <a:srcRect l="1375" t="29166" r="1625" b="17361"/>
+          <a:srcRect l="1331" r="1969"/>
           <a:stretch>
             <a:fillRect/>
           </a:stretch>
         </p:blipFill>
         <p:spPr>
           <a:xfrm>
-            <a:off x="0" y="14767560"/>
-            <a:ext cx="36584550" cy="18150840"/>
+            <a:off x="0" y="-1122630"/>
+            <a:ext cx="36576000" cy="34041030"/>
           </a:xfrm>
           <a:prstGeom prst="rect">
             <a:avLst/>

</xml_diff>

<commit_message>
added csvs with p values for pagel's lambda
</commit_message>
<xml_diff>
--- a/figures/fig4/fig4.pptx
+++ b/figures/fig4/fig4.pptx
@@ -10,7 +10,7 @@
   <p:sldIdLst>
     <p:sldId id="256" r:id="rId2"/>
     <p:sldId id="258" r:id="rId3"/>
-    <p:sldId id="257" r:id="rId4"/>
+    <p:sldId id="259" r:id="rId4"/>
   </p:sldIdLst>
   <p:sldSz cx="36576000" cy="32918400"/>
   <p:notesSz cx="7010400" cy="9296400"/>
@@ -259,7 +259,7 @@
       </p15:sldGuideLst>
     </p:ext>
     <p:ext uri="http://customooxmlschemas.google.com/">
-      <go:slidesCustomData xmlns:go="http://customooxmlschemas.google.com/" xmlns:ahyp="http://schemas.microsoft.com/office/drawing/2018/hyperlinkcolor" xmlns:p15="http://schemas.microsoft.com/office/powerpoint/2012/main" xmlns:p14="http://schemas.microsoft.com/office/powerpoint/2010/main" xmlns:com="http://schemas.openxmlformats.org/drawingml/2006/compatibility" xmlns:pvml="urn:schemas-microsoft-com:office:powerpoint" xmlns:v="urn:schemas-microsoft-com:vml" xmlns:o="urn:schemas-microsoft-com:office:office" xmlns:dgm="http://schemas.openxmlformats.org/drawingml/2006/diagram" xmlns:c="http://schemas.openxmlformats.org/drawingml/2006/chart" xmlns:mv="urn:schemas-microsoft-com:mac:vml" xmlns:mc="http://schemas.openxmlformats.org/markup-compatibility/2006" xmlns="" r:id="rId10" roundtripDataSignature="AMtx7mhiytGPk8UOxiAGs9KaAxakDbg4SQ=="/>
+      <go:slidesCustomData xmlns="" xmlns:mc="http://schemas.openxmlformats.org/markup-compatibility/2006" xmlns:mv="urn:schemas-microsoft-com:mac:vml" xmlns:c="http://schemas.openxmlformats.org/drawingml/2006/chart" xmlns:dgm="http://schemas.openxmlformats.org/drawingml/2006/diagram" xmlns:o="urn:schemas-microsoft-com:office:office" xmlns:v="urn:schemas-microsoft-com:vml" xmlns:pvml="urn:schemas-microsoft-com:office:powerpoint" xmlns:com="http://schemas.openxmlformats.org/drawingml/2006/compatibility" xmlns:p14="http://schemas.microsoft.com/office/powerpoint/2010/main" xmlns:p15="http://schemas.microsoft.com/office/powerpoint/2012/main" xmlns:ahyp="http://schemas.microsoft.com/office/drawing/2018/hyperlinkcolor" xmlns:go="http://customooxmlschemas.google.com/" r:id="rId10" roundtripDataSignature="AMtx7mhiytGPk8UOxiAGs9KaAxakDbg4SQ=="/>
     </p:ext>
   </p:extLst>
 </p:presentation>
@@ -1646,7 +1646,7 @@
         <p:cNvPr id="1" name="Shape 84">
           <a:extLst>
             <a:ext uri="{FF2B5EF4-FFF2-40B4-BE49-F238E27FC236}">
-              <a16:creationId xmlns:a16="http://schemas.microsoft.com/office/drawing/2014/main" id="{B67DD2D5-3B27-AA2F-7ADD-9EE69423159A}"/>
+              <a16:creationId xmlns:a16="http://schemas.microsoft.com/office/drawing/2014/main" id="{D1A3B8AC-CC6A-7D8D-C13F-948D82FDA332}"/>
             </a:ext>
           </a:extLst>
         </p:cNvPr>
@@ -1666,7 +1666,7 @@
           <p:cNvPr id="85" name="Google Shape;85;p1:notes">
             <a:extLst>
               <a:ext uri="{FF2B5EF4-FFF2-40B4-BE49-F238E27FC236}">
-                <a16:creationId xmlns:a16="http://schemas.microsoft.com/office/drawing/2014/main" id="{5BD78AC3-3EA2-2ABB-1804-6BF899618E75}"/>
+                <a16:creationId xmlns:a16="http://schemas.microsoft.com/office/drawing/2014/main" id="{E592EB3F-8B54-F209-DC3F-A21884A3A5A8}"/>
               </a:ext>
             </a:extLst>
           </p:cNvPr>
@@ -1723,7 +1723,7 @@
           <p:cNvPr id="86" name="Google Shape;86;p1:notes">
             <a:extLst>
               <a:ext uri="{FF2B5EF4-FFF2-40B4-BE49-F238E27FC236}">
-                <a16:creationId xmlns:a16="http://schemas.microsoft.com/office/drawing/2014/main" id="{469FB9AD-E58E-824E-C210-6C17AE138DB7}"/>
+                <a16:creationId xmlns:a16="http://schemas.microsoft.com/office/drawing/2014/main" id="{ADF3F668-2F9E-C366-4424-A8EBDD35C8D7}"/>
               </a:ext>
             </a:extLst>
           </p:cNvPr>
@@ -1771,7 +1771,7 @@
           <p:cNvPr id="87" name="Google Shape;87;p1:notes">
             <a:extLst>
               <a:ext uri="{FF2B5EF4-FFF2-40B4-BE49-F238E27FC236}">
-                <a16:creationId xmlns:a16="http://schemas.microsoft.com/office/drawing/2014/main" id="{665DED0C-D591-C8E2-59DC-55107135CE3D}"/>
+                <a16:creationId xmlns:a16="http://schemas.microsoft.com/office/drawing/2014/main" id="{0CDC491E-2B5C-AA8E-548B-40A1A0237548}"/>
               </a:ext>
             </a:extLst>
           </p:cNvPr>
@@ -1837,7 +1837,216 @@
     </p:spTree>
     <p:extLst>
       <p:ext uri="{BB962C8B-B14F-4D97-AF65-F5344CB8AC3E}">
-        <p14:creationId xmlns:p14="http://schemas.microsoft.com/office/powerpoint/2010/main" val="3711850135"/>
+        <p14:creationId xmlns:p14="http://schemas.microsoft.com/office/powerpoint/2010/main" val="1629572194"/>
+      </p:ext>
+    </p:extLst>
+  </p:cSld>
+  <p:clrMapOvr>
+    <a:masterClrMapping/>
+  </p:clrMapOvr>
+</p:notes>
+</file>
+
+<file path=ppt/notesSlides/notesSlide3.xml><?xml version="1.0" encoding="utf-8"?>
+<p:notes xmlns:a="http://schemas.openxmlformats.org/drawingml/2006/main" xmlns:r="http://schemas.openxmlformats.org/officeDocument/2006/relationships" xmlns:p="http://schemas.openxmlformats.org/presentationml/2006/main" showMasterSp="0" showMasterPhAnim="0">
+  <p:cSld>
+    <p:spTree>
+      <p:nvGrpSpPr>
+        <p:cNvPr id="1" name="Shape 84">
+          <a:extLst>
+            <a:ext uri="{FF2B5EF4-FFF2-40B4-BE49-F238E27FC236}">
+              <a16:creationId xmlns:a16="http://schemas.microsoft.com/office/drawing/2014/main" id="{71455529-9DB6-B995-5BF4-BCABE0513C41}"/>
+            </a:ext>
+          </a:extLst>
+        </p:cNvPr>
+        <p:cNvGrpSpPr/>
+        <p:nvPr/>
+      </p:nvGrpSpPr>
+      <p:grpSpPr>
+        <a:xfrm>
+          <a:off x="0" y="0"/>
+          <a:ext cx="0" cy="0"/>
+          <a:chOff x="0" y="0"/>
+          <a:chExt cx="0" cy="0"/>
+        </a:xfrm>
+      </p:grpSpPr>
+      <p:sp>
+        <p:nvSpPr>
+          <p:cNvPr id="85" name="Google Shape;85;p1:notes">
+            <a:extLst>
+              <a:ext uri="{FF2B5EF4-FFF2-40B4-BE49-F238E27FC236}">
+                <a16:creationId xmlns:a16="http://schemas.microsoft.com/office/drawing/2014/main" id="{B8BC4A6F-C5C0-EA02-3ADA-C4D38CB347E3}"/>
+              </a:ext>
+            </a:extLst>
+          </p:cNvPr>
+          <p:cNvSpPr>
+            <a:spLocks noGrp="1" noRot="1" noChangeAspect="1"/>
+          </p:cNvSpPr>
+          <p:nvPr>
+            <p:ph type="sldImg" idx="2"/>
+          </p:nvPr>
+        </p:nvSpPr>
+        <p:spPr>
+          <a:xfrm>
+            <a:off x="1568450" y="696913"/>
+            <a:ext cx="3873500" cy="3486150"/>
+          </a:xfrm>
+          <a:custGeom>
+            <a:avLst/>
+            <a:gdLst/>
+            <a:ahLst/>
+            <a:cxnLst/>
+            <a:rect l="l" t="t" r="r" b="b"/>
+            <a:pathLst>
+              <a:path w="120000" h="120000" extrusionOk="0">
+                <a:moveTo>
+                  <a:pt x="0" y="0"/>
+                </a:moveTo>
+                <a:lnTo>
+                  <a:pt x="120000" y="0"/>
+                </a:lnTo>
+                <a:lnTo>
+                  <a:pt x="120000" y="120000"/>
+                </a:lnTo>
+                <a:lnTo>
+                  <a:pt x="0" y="120000"/>
+                </a:lnTo>
+                <a:close/>
+              </a:path>
+            </a:pathLst>
+          </a:custGeom>
+          <a:noFill/>
+          <a:ln w="9525" cap="flat" cmpd="sng">
+            <a:solidFill>
+              <a:srgbClr val="000000"/>
+            </a:solidFill>
+            <a:prstDash val="solid"/>
+            <a:miter lim="800000"/>
+            <a:headEnd type="none" w="sm" len="sm"/>
+            <a:tailEnd type="none" w="sm" len="sm"/>
+          </a:ln>
+        </p:spPr>
+      </p:sp>
+      <p:sp>
+        <p:nvSpPr>
+          <p:cNvPr id="86" name="Google Shape;86;p1:notes">
+            <a:extLst>
+              <a:ext uri="{FF2B5EF4-FFF2-40B4-BE49-F238E27FC236}">
+                <a16:creationId xmlns:a16="http://schemas.microsoft.com/office/drawing/2014/main" id="{CF1347EC-B152-362B-2A52-E8300BBB3F51}"/>
+              </a:ext>
+            </a:extLst>
+          </p:cNvPr>
+          <p:cNvSpPr txBox="1">
+            <a:spLocks noGrp="1"/>
+          </p:cNvSpPr>
+          <p:nvPr>
+            <p:ph type="body" idx="1"/>
+          </p:nvPr>
+        </p:nvSpPr>
+        <p:spPr>
+          <a:xfrm>
+            <a:off x="701675" y="4416425"/>
+            <a:ext cx="5607050" cy="4183063"/>
+          </a:xfrm>
+          <a:prstGeom prst="rect">
+            <a:avLst/>
+          </a:prstGeom>
+          <a:noFill/>
+          <a:ln>
+            <a:noFill/>
+          </a:ln>
+        </p:spPr>
+        <p:txBody>
+          <a:bodyPr spcFirstLastPara="1" wrap="square" lIns="93150" tIns="46575" rIns="93150" bIns="46575" anchor="t" anchorCtr="0">
+            <a:noAutofit/>
+          </a:bodyPr>
+          <a:lstStyle/>
+          <a:p>
+            <a:pPr marL="0" lvl="0" indent="0" algn="l" rtl="0">
+              <a:spcBef>
+                <a:spcPts val="0"/>
+              </a:spcBef>
+              <a:spcAft>
+                <a:spcPts val="0"/>
+              </a:spcAft>
+              <a:buNone/>
+            </a:pPr>
+            <a:endParaRPr dirty="0"/>
+          </a:p>
+        </p:txBody>
+      </p:sp>
+      <p:sp>
+        <p:nvSpPr>
+          <p:cNvPr id="87" name="Google Shape;87;p1:notes">
+            <a:extLst>
+              <a:ext uri="{FF2B5EF4-FFF2-40B4-BE49-F238E27FC236}">
+                <a16:creationId xmlns:a16="http://schemas.microsoft.com/office/drawing/2014/main" id="{33E0FB64-C02A-5D86-B10E-350EF603AF5A}"/>
+              </a:ext>
+            </a:extLst>
+          </p:cNvPr>
+          <p:cNvSpPr txBox="1">
+            <a:spLocks noGrp="1"/>
+          </p:cNvSpPr>
+          <p:nvPr>
+            <p:ph type="sldNum" idx="12"/>
+          </p:nvPr>
+        </p:nvSpPr>
+        <p:spPr>
+          <a:xfrm>
+            <a:off x="3970338" y="8829675"/>
+            <a:ext cx="3038475" cy="465138"/>
+          </a:xfrm>
+          <a:prstGeom prst="rect">
+            <a:avLst/>
+          </a:prstGeom>
+          <a:noFill/>
+          <a:ln>
+            <a:noFill/>
+          </a:ln>
+        </p:spPr>
+        <p:txBody>
+          <a:bodyPr spcFirstLastPara="1" wrap="square" lIns="93150" tIns="46575" rIns="93150" bIns="46575" anchor="b" anchorCtr="0">
+            <a:noAutofit/>
+          </a:bodyPr>
+          <a:lstStyle/>
+          <a:p>
+            <a:pPr marL="0" marR="0" lvl="0" indent="0" algn="r" rtl="0">
+              <a:spcBef>
+                <a:spcPts val="0"/>
+              </a:spcBef>
+              <a:spcAft>
+                <a:spcPts val="0"/>
+              </a:spcAft>
+              <a:buNone/>
+            </a:pPr>
+            <a:fld id="{00000000-1234-1234-1234-123412341234}" type="slidenum">
+              <a:rPr lang="en-US" sz="1200" b="0" i="0" u="none" strike="noStrike" cap="none">
+                <a:solidFill>
+                  <a:schemeClr val="dk1"/>
+                </a:solidFill>
+                <a:latin typeface="Calibri"/>
+                <a:ea typeface="Calibri"/>
+                <a:cs typeface="Calibri"/>
+                <a:sym typeface="Calibri"/>
+              </a:rPr>
+              <a:t>3</a:t>
+            </a:fld>
+            <a:endParaRPr sz="1200" b="0" i="0" u="none" strike="noStrike" cap="none">
+              <a:solidFill>
+                <a:schemeClr val="dk1"/>
+              </a:solidFill>
+              <a:latin typeface="Calibri"/>
+              <a:ea typeface="Calibri"/>
+              <a:cs typeface="Calibri"/>
+              <a:sym typeface="Calibri"/>
+            </a:endParaRPr>
+          </a:p>
+        </p:txBody>
+      </p:sp>
+    </p:spTree>
+    <p:extLst>
+      <p:ext uri="{BB962C8B-B14F-4D97-AF65-F5344CB8AC3E}">
+        <p14:creationId xmlns:p14="http://schemas.microsoft.com/office/powerpoint/2010/main" val="80920628"/>
       </p:ext>
     </p:extLst>
   </p:cSld>
@@ -2347,1593 +2556,7 @@
 </p:sldLayout>
 </file>
 
-<file path=ppt/slideLayouts/slideLayout10.xml><?xml version="1.0" encoding="utf-8"?>
-<p:sldLayout xmlns:a="http://schemas.openxmlformats.org/drawingml/2006/main" xmlns:r="http://schemas.openxmlformats.org/officeDocument/2006/relationships" xmlns:p="http://schemas.openxmlformats.org/presentationml/2006/main" matchingName="Vertical Title and Text" type="vertTitleAndTx">
-  <p:cSld name="VERTICAL_TITLE_AND_VERTICAL_TEXT">
-    <p:spTree>
-      <p:nvGrpSpPr>
-        <p:cNvPr id="1" name="Shape 78"/>
-        <p:cNvGrpSpPr/>
-        <p:nvPr/>
-      </p:nvGrpSpPr>
-      <p:grpSpPr>
-        <a:xfrm>
-          <a:off x="0" y="0"/>
-          <a:ext cx="0" cy="0"/>
-          <a:chOff x="0" y="0"/>
-          <a:chExt cx="0" cy="0"/>
-        </a:xfrm>
-      </p:grpSpPr>
-      <p:sp>
-        <p:nvSpPr>
-          <p:cNvPr id="79" name="Google Shape;79;p13"/>
-          <p:cNvSpPr txBox="1">
-            <a:spLocks noGrp="1"/>
-          </p:cNvSpPr>
-          <p:nvPr>
-            <p:ph type="title"/>
-          </p:nvPr>
-        </p:nvSpPr>
-        <p:spPr>
-          <a:xfrm rot="5400000">
-            <a:off x="85751673" y="53160931"/>
-            <a:ext cx="134820662" cy="41148001"/>
-          </a:xfrm>
-          <a:prstGeom prst="rect">
-            <a:avLst/>
-          </a:prstGeom>
-          <a:noFill/>
-          <a:ln>
-            <a:noFill/>
-          </a:ln>
-        </p:spPr>
-        <p:txBody>
-          <a:bodyPr spcFirstLastPara="1" wrap="square" lIns="349525" tIns="174750" rIns="349525" bIns="174750" anchor="ctr" anchorCtr="0">
-            <a:noAutofit/>
-          </a:bodyPr>
-          <a:lstStyle>
-            <a:lvl1pPr lvl="0" algn="ctr">
-              <a:spcBef>
-                <a:spcPts val="0"/>
-              </a:spcBef>
-              <a:spcAft>
-                <a:spcPts val="0"/>
-              </a:spcAft>
-              <a:buSzPts val="1400"/>
-              <a:buNone/>
-              <a:defRPr/>
-            </a:lvl1pPr>
-            <a:lvl2pPr lvl="1" algn="ctr">
-              <a:spcBef>
-                <a:spcPts val="0"/>
-              </a:spcBef>
-              <a:spcAft>
-                <a:spcPts val="0"/>
-              </a:spcAft>
-              <a:buSzPts val="1400"/>
-              <a:buNone/>
-              <a:defRPr/>
-            </a:lvl2pPr>
-            <a:lvl3pPr lvl="2" algn="ctr">
-              <a:spcBef>
-                <a:spcPts val="0"/>
-              </a:spcBef>
-              <a:spcAft>
-                <a:spcPts val="0"/>
-              </a:spcAft>
-              <a:buSzPts val="1400"/>
-              <a:buNone/>
-              <a:defRPr/>
-            </a:lvl3pPr>
-            <a:lvl4pPr lvl="3" algn="ctr">
-              <a:spcBef>
-                <a:spcPts val="0"/>
-              </a:spcBef>
-              <a:spcAft>
-                <a:spcPts val="0"/>
-              </a:spcAft>
-              <a:buSzPts val="1400"/>
-              <a:buNone/>
-              <a:defRPr/>
-            </a:lvl4pPr>
-            <a:lvl5pPr lvl="4" algn="ctr">
-              <a:spcBef>
-                <a:spcPts val="0"/>
-              </a:spcBef>
-              <a:spcAft>
-                <a:spcPts val="0"/>
-              </a:spcAft>
-              <a:buSzPts val="1400"/>
-              <a:buNone/>
-              <a:defRPr/>
-            </a:lvl5pPr>
-            <a:lvl6pPr lvl="5" algn="ctr">
-              <a:spcBef>
-                <a:spcPts val="0"/>
-              </a:spcBef>
-              <a:spcAft>
-                <a:spcPts val="0"/>
-              </a:spcAft>
-              <a:buSzPts val="1400"/>
-              <a:buNone/>
-              <a:defRPr/>
-            </a:lvl6pPr>
-            <a:lvl7pPr lvl="6" algn="ctr">
-              <a:spcBef>
-                <a:spcPts val="0"/>
-              </a:spcBef>
-              <a:spcAft>
-                <a:spcPts val="0"/>
-              </a:spcAft>
-              <a:buSzPts val="1400"/>
-              <a:buNone/>
-              <a:defRPr/>
-            </a:lvl7pPr>
-            <a:lvl8pPr lvl="7" algn="ctr">
-              <a:spcBef>
-                <a:spcPts val="0"/>
-              </a:spcBef>
-              <a:spcAft>
-                <a:spcPts val="0"/>
-              </a:spcAft>
-              <a:buSzPts val="1400"/>
-              <a:buNone/>
-              <a:defRPr/>
-            </a:lvl8pPr>
-            <a:lvl9pPr lvl="8" algn="ctr">
-              <a:spcBef>
-                <a:spcPts val="0"/>
-              </a:spcBef>
-              <a:spcAft>
-                <a:spcPts val="0"/>
-              </a:spcAft>
-              <a:buSzPts val="1400"/>
-              <a:buNone/>
-              <a:defRPr/>
-            </a:lvl9pPr>
-          </a:lstStyle>
-          <a:p>
-            <a:endParaRPr/>
-          </a:p>
-        </p:txBody>
-      </p:sp>
-      <p:sp>
-        <p:nvSpPr>
-          <p:cNvPr id="80" name="Google Shape;80;p13"/>
-          <p:cNvSpPr txBox="1">
-            <a:spLocks noGrp="1"/>
-          </p:cNvSpPr>
-          <p:nvPr>
-            <p:ph type="body" idx="1"/>
-          </p:nvPr>
-        </p:nvSpPr>
-        <p:spPr>
-          <a:xfrm rot="5400000">
-            <a:off x="3150869" y="12317731"/>
-            <a:ext cx="134820662" cy="122834400"/>
-          </a:xfrm>
-          <a:prstGeom prst="rect">
-            <a:avLst/>
-          </a:prstGeom>
-          <a:noFill/>
-          <a:ln>
-            <a:noFill/>
-          </a:ln>
-        </p:spPr>
-        <p:txBody>
-          <a:bodyPr spcFirstLastPara="1" wrap="square" lIns="349525" tIns="174750" rIns="349525" bIns="174750" anchor="t" anchorCtr="0">
-            <a:noAutofit/>
-          </a:bodyPr>
-          <a:lstStyle>
-            <a:lvl1pPr marL="457200" lvl="0" indent="-342900" algn="l">
-              <a:spcBef>
-                <a:spcPts val="360"/>
-              </a:spcBef>
-              <a:spcAft>
-                <a:spcPts val="0"/>
-              </a:spcAft>
-              <a:buClr>
-                <a:schemeClr val="dk1"/>
-              </a:buClr>
-              <a:buSzPts val="1800"/>
-              <a:buChar char="•"/>
-              <a:defRPr/>
-            </a:lvl1pPr>
-            <a:lvl2pPr marL="914400" lvl="1" indent="-342900" algn="l">
-              <a:spcBef>
-                <a:spcPts val="360"/>
-              </a:spcBef>
-              <a:spcAft>
-                <a:spcPts val="0"/>
-              </a:spcAft>
-              <a:buClr>
-                <a:schemeClr val="dk1"/>
-              </a:buClr>
-              <a:buSzPts val="1800"/>
-              <a:buChar char="–"/>
-              <a:defRPr/>
-            </a:lvl2pPr>
-            <a:lvl3pPr marL="1371600" lvl="2" indent="-342900" algn="l">
-              <a:spcBef>
-                <a:spcPts val="360"/>
-              </a:spcBef>
-              <a:spcAft>
-                <a:spcPts val="0"/>
-              </a:spcAft>
-              <a:buClr>
-                <a:schemeClr val="dk1"/>
-              </a:buClr>
-              <a:buSzPts val="1800"/>
-              <a:buChar char="•"/>
-              <a:defRPr/>
-            </a:lvl3pPr>
-            <a:lvl4pPr marL="1828800" lvl="3" indent="-342900" algn="l">
-              <a:spcBef>
-                <a:spcPts val="360"/>
-              </a:spcBef>
-              <a:spcAft>
-                <a:spcPts val="0"/>
-              </a:spcAft>
-              <a:buClr>
-                <a:schemeClr val="dk1"/>
-              </a:buClr>
-              <a:buSzPts val="1800"/>
-              <a:buChar char="–"/>
-              <a:defRPr/>
-            </a:lvl4pPr>
-            <a:lvl5pPr marL="2286000" lvl="4" indent="-342900" algn="l">
-              <a:spcBef>
-                <a:spcPts val="360"/>
-              </a:spcBef>
-              <a:spcAft>
-                <a:spcPts val="0"/>
-              </a:spcAft>
-              <a:buClr>
-                <a:schemeClr val="dk1"/>
-              </a:buClr>
-              <a:buSzPts val="1800"/>
-              <a:buChar char="»"/>
-              <a:defRPr/>
-            </a:lvl5pPr>
-            <a:lvl6pPr marL="2743200" lvl="5" indent="-342900" algn="l">
-              <a:spcBef>
-                <a:spcPts val="360"/>
-              </a:spcBef>
-              <a:spcAft>
-                <a:spcPts val="0"/>
-              </a:spcAft>
-              <a:buClr>
-                <a:schemeClr val="dk1"/>
-              </a:buClr>
-              <a:buSzPts val="1800"/>
-              <a:buChar char="•"/>
-              <a:defRPr/>
-            </a:lvl6pPr>
-            <a:lvl7pPr marL="3200400" lvl="6" indent="-342900" algn="l">
-              <a:spcBef>
-                <a:spcPts val="360"/>
-              </a:spcBef>
-              <a:spcAft>
-                <a:spcPts val="0"/>
-              </a:spcAft>
-              <a:buClr>
-                <a:schemeClr val="dk1"/>
-              </a:buClr>
-              <a:buSzPts val="1800"/>
-              <a:buChar char="•"/>
-              <a:defRPr/>
-            </a:lvl7pPr>
-            <a:lvl8pPr marL="3657600" lvl="7" indent="-342900" algn="l">
-              <a:spcBef>
-                <a:spcPts val="360"/>
-              </a:spcBef>
-              <a:spcAft>
-                <a:spcPts val="0"/>
-              </a:spcAft>
-              <a:buClr>
-                <a:schemeClr val="dk1"/>
-              </a:buClr>
-              <a:buSzPts val="1800"/>
-              <a:buChar char="•"/>
-              <a:defRPr/>
-            </a:lvl8pPr>
-            <a:lvl9pPr marL="4114800" lvl="8" indent="-342900" algn="l">
-              <a:spcBef>
-                <a:spcPts val="360"/>
-              </a:spcBef>
-              <a:spcAft>
-                <a:spcPts val="0"/>
-              </a:spcAft>
-              <a:buClr>
-                <a:schemeClr val="dk1"/>
-              </a:buClr>
-              <a:buSzPts val="1800"/>
-              <a:buChar char="•"/>
-              <a:defRPr/>
-            </a:lvl9pPr>
-          </a:lstStyle>
-          <a:p>
-            <a:endParaRPr/>
-          </a:p>
-        </p:txBody>
-      </p:sp>
-      <p:sp>
-        <p:nvSpPr>
-          <p:cNvPr id="81" name="Google Shape;81;p13"/>
-          <p:cNvSpPr txBox="1">
-            <a:spLocks noGrp="1"/>
-          </p:cNvSpPr>
-          <p:nvPr>
-            <p:ph type="dt" idx="10"/>
-          </p:nvPr>
-        </p:nvSpPr>
-        <p:spPr>
-          <a:xfrm>
-            <a:off x="1829043" y="30510162"/>
-            <a:ext cx="8533917" cy="1753557"/>
-          </a:xfrm>
-          <a:prstGeom prst="rect">
-            <a:avLst/>
-          </a:prstGeom>
-          <a:noFill/>
-          <a:ln>
-            <a:noFill/>
-          </a:ln>
-        </p:spPr>
-        <p:txBody>
-          <a:bodyPr spcFirstLastPara="1" wrap="square" lIns="349525" tIns="174750" rIns="349525" bIns="174750" anchor="ctr" anchorCtr="0">
-            <a:noAutofit/>
-          </a:bodyPr>
-          <a:lstStyle>
-            <a:lvl1pPr lvl="0" algn="l">
-              <a:spcBef>
-                <a:spcPts val="0"/>
-              </a:spcBef>
-              <a:spcAft>
-                <a:spcPts val="0"/>
-              </a:spcAft>
-              <a:buSzPts val="1400"/>
-              <a:buNone/>
-              <a:defRPr/>
-            </a:lvl1pPr>
-            <a:lvl2pPr lvl="1" algn="l">
-              <a:spcBef>
-                <a:spcPts val="0"/>
-              </a:spcBef>
-              <a:spcAft>
-                <a:spcPts val="0"/>
-              </a:spcAft>
-              <a:buSzPts val="1400"/>
-              <a:buNone/>
-              <a:defRPr/>
-            </a:lvl2pPr>
-            <a:lvl3pPr lvl="2" algn="l">
-              <a:spcBef>
-                <a:spcPts val="0"/>
-              </a:spcBef>
-              <a:spcAft>
-                <a:spcPts val="0"/>
-              </a:spcAft>
-              <a:buSzPts val="1400"/>
-              <a:buNone/>
-              <a:defRPr/>
-            </a:lvl3pPr>
-            <a:lvl4pPr lvl="3" algn="l">
-              <a:spcBef>
-                <a:spcPts val="0"/>
-              </a:spcBef>
-              <a:spcAft>
-                <a:spcPts val="0"/>
-              </a:spcAft>
-              <a:buSzPts val="1400"/>
-              <a:buNone/>
-              <a:defRPr/>
-            </a:lvl4pPr>
-            <a:lvl5pPr lvl="4" algn="l">
-              <a:spcBef>
-                <a:spcPts val="0"/>
-              </a:spcBef>
-              <a:spcAft>
-                <a:spcPts val="0"/>
-              </a:spcAft>
-              <a:buSzPts val="1400"/>
-              <a:buNone/>
-              <a:defRPr/>
-            </a:lvl5pPr>
-            <a:lvl6pPr lvl="5" algn="l">
-              <a:spcBef>
-                <a:spcPts val="0"/>
-              </a:spcBef>
-              <a:spcAft>
-                <a:spcPts val="0"/>
-              </a:spcAft>
-              <a:buSzPts val="1400"/>
-              <a:buNone/>
-              <a:defRPr/>
-            </a:lvl6pPr>
-            <a:lvl7pPr lvl="6" algn="l">
-              <a:spcBef>
-                <a:spcPts val="0"/>
-              </a:spcBef>
-              <a:spcAft>
-                <a:spcPts val="0"/>
-              </a:spcAft>
-              <a:buSzPts val="1400"/>
-              <a:buNone/>
-              <a:defRPr/>
-            </a:lvl7pPr>
-            <a:lvl8pPr lvl="7" algn="l">
-              <a:spcBef>
-                <a:spcPts val="0"/>
-              </a:spcBef>
-              <a:spcAft>
-                <a:spcPts val="0"/>
-              </a:spcAft>
-              <a:buSzPts val="1400"/>
-              <a:buNone/>
-              <a:defRPr/>
-            </a:lvl8pPr>
-            <a:lvl9pPr lvl="8" algn="l">
-              <a:spcBef>
-                <a:spcPts val="0"/>
-              </a:spcBef>
-              <a:spcAft>
-                <a:spcPts val="0"/>
-              </a:spcAft>
-              <a:buSzPts val="1400"/>
-              <a:buNone/>
-              <a:defRPr/>
-            </a:lvl9pPr>
-          </a:lstStyle>
-          <a:p>
-            <a:endParaRPr/>
-          </a:p>
-        </p:txBody>
-      </p:sp>
-      <p:sp>
-        <p:nvSpPr>
-          <p:cNvPr id="82" name="Google Shape;82;p13"/>
-          <p:cNvSpPr txBox="1">
-            <a:spLocks noGrp="1"/>
-          </p:cNvSpPr>
-          <p:nvPr>
-            <p:ph type="ftr" idx="11"/>
-          </p:nvPr>
-        </p:nvSpPr>
-        <p:spPr>
-          <a:xfrm>
-            <a:off x="12496840" y="30510162"/>
-            <a:ext cx="11582320" cy="1753557"/>
-          </a:xfrm>
-          <a:prstGeom prst="rect">
-            <a:avLst/>
-          </a:prstGeom>
-          <a:noFill/>
-          <a:ln>
-            <a:noFill/>
-          </a:ln>
-        </p:spPr>
-        <p:txBody>
-          <a:bodyPr spcFirstLastPara="1" wrap="square" lIns="349525" tIns="174750" rIns="349525" bIns="174750" anchor="ctr" anchorCtr="0">
-            <a:noAutofit/>
-          </a:bodyPr>
-          <a:lstStyle>
-            <a:lvl1pPr lvl="0" algn="ctr">
-              <a:spcBef>
-                <a:spcPts val="0"/>
-              </a:spcBef>
-              <a:spcAft>
-                <a:spcPts val="0"/>
-              </a:spcAft>
-              <a:buSzPts val="1400"/>
-              <a:buNone/>
-              <a:defRPr/>
-            </a:lvl1pPr>
-            <a:lvl2pPr lvl="1" algn="l">
-              <a:spcBef>
-                <a:spcPts val="0"/>
-              </a:spcBef>
-              <a:spcAft>
-                <a:spcPts val="0"/>
-              </a:spcAft>
-              <a:buSzPts val="1400"/>
-              <a:buNone/>
-              <a:defRPr/>
-            </a:lvl2pPr>
-            <a:lvl3pPr lvl="2" algn="l">
-              <a:spcBef>
-                <a:spcPts val="0"/>
-              </a:spcBef>
-              <a:spcAft>
-                <a:spcPts val="0"/>
-              </a:spcAft>
-              <a:buSzPts val="1400"/>
-              <a:buNone/>
-              <a:defRPr/>
-            </a:lvl3pPr>
-            <a:lvl4pPr lvl="3" algn="l">
-              <a:spcBef>
-                <a:spcPts val="0"/>
-              </a:spcBef>
-              <a:spcAft>
-                <a:spcPts val="0"/>
-              </a:spcAft>
-              <a:buSzPts val="1400"/>
-              <a:buNone/>
-              <a:defRPr/>
-            </a:lvl4pPr>
-            <a:lvl5pPr lvl="4" algn="l">
-              <a:spcBef>
-                <a:spcPts val="0"/>
-              </a:spcBef>
-              <a:spcAft>
-                <a:spcPts val="0"/>
-              </a:spcAft>
-              <a:buSzPts val="1400"/>
-              <a:buNone/>
-              <a:defRPr/>
-            </a:lvl5pPr>
-            <a:lvl6pPr lvl="5" algn="l">
-              <a:spcBef>
-                <a:spcPts val="0"/>
-              </a:spcBef>
-              <a:spcAft>
-                <a:spcPts val="0"/>
-              </a:spcAft>
-              <a:buSzPts val="1400"/>
-              <a:buNone/>
-              <a:defRPr/>
-            </a:lvl6pPr>
-            <a:lvl7pPr lvl="6" algn="l">
-              <a:spcBef>
-                <a:spcPts val="0"/>
-              </a:spcBef>
-              <a:spcAft>
-                <a:spcPts val="0"/>
-              </a:spcAft>
-              <a:buSzPts val="1400"/>
-              <a:buNone/>
-              <a:defRPr/>
-            </a:lvl7pPr>
-            <a:lvl8pPr lvl="7" algn="l">
-              <a:spcBef>
-                <a:spcPts val="0"/>
-              </a:spcBef>
-              <a:spcAft>
-                <a:spcPts val="0"/>
-              </a:spcAft>
-              <a:buSzPts val="1400"/>
-              <a:buNone/>
-              <a:defRPr/>
-            </a:lvl8pPr>
-            <a:lvl9pPr lvl="8" algn="l">
-              <a:spcBef>
-                <a:spcPts val="0"/>
-              </a:spcBef>
-              <a:spcAft>
-                <a:spcPts val="0"/>
-              </a:spcAft>
-              <a:buSzPts val="1400"/>
-              <a:buNone/>
-              <a:defRPr/>
-            </a:lvl9pPr>
-          </a:lstStyle>
-          <a:p>
-            <a:endParaRPr/>
-          </a:p>
-        </p:txBody>
-      </p:sp>
-      <p:sp>
-        <p:nvSpPr>
-          <p:cNvPr id="83" name="Google Shape;83;p13"/>
-          <p:cNvSpPr txBox="1">
-            <a:spLocks noGrp="1"/>
-          </p:cNvSpPr>
-          <p:nvPr>
-            <p:ph type="sldNum" idx="12"/>
-          </p:nvPr>
-        </p:nvSpPr>
-        <p:spPr>
-          <a:xfrm>
-            <a:off x="26213043" y="30510162"/>
-            <a:ext cx="8533917" cy="1753557"/>
-          </a:xfrm>
-          <a:prstGeom prst="rect">
-            <a:avLst/>
-          </a:prstGeom>
-          <a:noFill/>
-          <a:ln>
-            <a:noFill/>
-          </a:ln>
-        </p:spPr>
-        <p:txBody>
-          <a:bodyPr spcFirstLastPara="1" wrap="square" lIns="349525" tIns="174750" rIns="349525" bIns="174750" anchor="ctr" anchorCtr="0">
-            <a:noAutofit/>
-          </a:bodyPr>
-          <a:lstStyle>
-            <a:lvl1pPr marL="0" marR="0" lvl="0" indent="0" algn="r">
-              <a:spcBef>
-                <a:spcPts val="0"/>
-              </a:spcBef>
-              <a:spcAft>
-                <a:spcPts val="0"/>
-              </a:spcAft>
-              <a:buNone/>
-              <a:defRPr sz="4674" b="0" i="0" u="none" strike="noStrike" cap="none">
-                <a:solidFill>
-                  <a:srgbClr val="888888"/>
-                </a:solidFill>
-                <a:latin typeface="Calibri"/>
-                <a:ea typeface="Calibri"/>
-                <a:cs typeface="Calibri"/>
-                <a:sym typeface="Calibri"/>
-              </a:defRPr>
-            </a:lvl1pPr>
-            <a:lvl2pPr marL="0" marR="0" lvl="1" indent="0" algn="r">
-              <a:spcBef>
-                <a:spcPts val="0"/>
-              </a:spcBef>
-              <a:spcAft>
-                <a:spcPts val="0"/>
-              </a:spcAft>
-              <a:buNone/>
-              <a:defRPr sz="4674" b="0" i="0" u="none" strike="noStrike" cap="none">
-                <a:solidFill>
-                  <a:srgbClr val="888888"/>
-                </a:solidFill>
-                <a:latin typeface="Calibri"/>
-                <a:ea typeface="Calibri"/>
-                <a:cs typeface="Calibri"/>
-                <a:sym typeface="Calibri"/>
-              </a:defRPr>
-            </a:lvl2pPr>
-            <a:lvl3pPr marL="0" marR="0" lvl="2" indent="0" algn="r">
-              <a:spcBef>
-                <a:spcPts val="0"/>
-              </a:spcBef>
-              <a:spcAft>
-                <a:spcPts val="0"/>
-              </a:spcAft>
-              <a:buNone/>
-              <a:defRPr sz="4674" b="0" i="0" u="none" strike="noStrike" cap="none">
-                <a:solidFill>
-                  <a:srgbClr val="888888"/>
-                </a:solidFill>
-                <a:latin typeface="Calibri"/>
-                <a:ea typeface="Calibri"/>
-                <a:cs typeface="Calibri"/>
-                <a:sym typeface="Calibri"/>
-              </a:defRPr>
-            </a:lvl3pPr>
-            <a:lvl4pPr marL="0" marR="0" lvl="3" indent="0" algn="r">
-              <a:spcBef>
-                <a:spcPts val="0"/>
-              </a:spcBef>
-              <a:spcAft>
-                <a:spcPts val="0"/>
-              </a:spcAft>
-              <a:buNone/>
-              <a:defRPr sz="4674" b="0" i="0" u="none" strike="noStrike" cap="none">
-                <a:solidFill>
-                  <a:srgbClr val="888888"/>
-                </a:solidFill>
-                <a:latin typeface="Calibri"/>
-                <a:ea typeface="Calibri"/>
-                <a:cs typeface="Calibri"/>
-                <a:sym typeface="Calibri"/>
-              </a:defRPr>
-            </a:lvl4pPr>
-            <a:lvl5pPr marL="0" marR="0" lvl="4" indent="0" algn="r">
-              <a:spcBef>
-                <a:spcPts val="0"/>
-              </a:spcBef>
-              <a:spcAft>
-                <a:spcPts val="0"/>
-              </a:spcAft>
-              <a:buNone/>
-              <a:defRPr sz="4674" b="0" i="0" u="none" strike="noStrike" cap="none">
-                <a:solidFill>
-                  <a:srgbClr val="888888"/>
-                </a:solidFill>
-                <a:latin typeface="Calibri"/>
-                <a:ea typeface="Calibri"/>
-                <a:cs typeface="Calibri"/>
-                <a:sym typeface="Calibri"/>
-              </a:defRPr>
-            </a:lvl5pPr>
-            <a:lvl6pPr marL="0" marR="0" lvl="5" indent="0" algn="r">
-              <a:spcBef>
-                <a:spcPts val="0"/>
-              </a:spcBef>
-              <a:spcAft>
-                <a:spcPts val="0"/>
-              </a:spcAft>
-              <a:buNone/>
-              <a:defRPr sz="4674" b="0" i="0" u="none" strike="noStrike" cap="none">
-                <a:solidFill>
-                  <a:srgbClr val="888888"/>
-                </a:solidFill>
-                <a:latin typeface="Calibri"/>
-                <a:ea typeface="Calibri"/>
-                <a:cs typeface="Calibri"/>
-                <a:sym typeface="Calibri"/>
-              </a:defRPr>
-            </a:lvl6pPr>
-            <a:lvl7pPr marL="0" marR="0" lvl="6" indent="0" algn="r">
-              <a:spcBef>
-                <a:spcPts val="0"/>
-              </a:spcBef>
-              <a:spcAft>
-                <a:spcPts val="0"/>
-              </a:spcAft>
-              <a:buNone/>
-              <a:defRPr sz="4674" b="0" i="0" u="none" strike="noStrike" cap="none">
-                <a:solidFill>
-                  <a:srgbClr val="888888"/>
-                </a:solidFill>
-                <a:latin typeface="Calibri"/>
-                <a:ea typeface="Calibri"/>
-                <a:cs typeface="Calibri"/>
-                <a:sym typeface="Calibri"/>
-              </a:defRPr>
-            </a:lvl7pPr>
-            <a:lvl8pPr marL="0" marR="0" lvl="7" indent="0" algn="r">
-              <a:spcBef>
-                <a:spcPts val="0"/>
-              </a:spcBef>
-              <a:spcAft>
-                <a:spcPts val="0"/>
-              </a:spcAft>
-              <a:buNone/>
-              <a:defRPr sz="4674" b="0" i="0" u="none" strike="noStrike" cap="none">
-                <a:solidFill>
-                  <a:srgbClr val="888888"/>
-                </a:solidFill>
-                <a:latin typeface="Calibri"/>
-                <a:ea typeface="Calibri"/>
-                <a:cs typeface="Calibri"/>
-                <a:sym typeface="Calibri"/>
-              </a:defRPr>
-            </a:lvl8pPr>
-            <a:lvl9pPr marL="0" marR="0" lvl="8" indent="0" algn="r">
-              <a:spcBef>
-                <a:spcPts val="0"/>
-              </a:spcBef>
-              <a:spcAft>
-                <a:spcPts val="0"/>
-              </a:spcAft>
-              <a:buNone/>
-              <a:defRPr sz="4674" b="0" i="0" u="none" strike="noStrike" cap="none">
-                <a:solidFill>
-                  <a:srgbClr val="888888"/>
-                </a:solidFill>
-                <a:latin typeface="Calibri"/>
-                <a:ea typeface="Calibri"/>
-                <a:cs typeface="Calibri"/>
-                <a:sym typeface="Calibri"/>
-              </a:defRPr>
-            </a:lvl9pPr>
-          </a:lstStyle>
-          <a:p>
-            <a:pPr marL="0" lvl="0" indent="0" algn="r" rtl="0">
-              <a:spcBef>
-                <a:spcPts val="0"/>
-              </a:spcBef>
-              <a:spcAft>
-                <a:spcPts val="0"/>
-              </a:spcAft>
-              <a:buNone/>
-            </a:pPr>
-            <a:fld id="{00000000-1234-1234-1234-123412341234}" type="slidenum">
-              <a:rPr lang="en-US"/>
-              <a:t>‹#›</a:t>
-            </a:fld>
-            <a:endParaRPr/>
-          </a:p>
-        </p:txBody>
-      </p:sp>
-    </p:spTree>
-  </p:cSld>
-  <p:clrMapOvr>
-    <a:masterClrMapping/>
-  </p:clrMapOvr>
-</p:sldLayout>
-</file>
-
 <file path=ppt/slideLayouts/slideLayout2.xml><?xml version="1.0" encoding="utf-8"?>
-<p:sldLayout xmlns:a="http://schemas.openxmlformats.org/drawingml/2006/main" xmlns:r="http://schemas.openxmlformats.org/officeDocument/2006/relationships" xmlns:p="http://schemas.openxmlformats.org/presentationml/2006/main" matchingName="Title and Content" type="obj">
-  <p:cSld name="OBJECT">
-    <p:spTree>
-      <p:nvGrpSpPr>
-        <p:cNvPr id="1" name="Shape 25"/>
-        <p:cNvGrpSpPr/>
-        <p:nvPr/>
-      </p:nvGrpSpPr>
-      <p:grpSpPr>
-        <a:xfrm>
-          <a:off x="0" y="0"/>
-          <a:ext cx="0" cy="0"/>
-          <a:chOff x="0" y="0"/>
-          <a:chExt cx="0" cy="0"/>
-        </a:xfrm>
-      </p:grpSpPr>
-      <p:sp>
-        <p:nvSpPr>
-          <p:cNvPr id="26" name="Google Shape;26;p5"/>
-          <p:cNvSpPr txBox="1">
-            <a:spLocks noGrp="1"/>
-          </p:cNvSpPr>
-          <p:nvPr>
-            <p:ph type="title"/>
-          </p:nvPr>
-        </p:nvSpPr>
-        <p:spPr>
-          <a:xfrm>
-            <a:off x="1829042" y="1318072"/>
-            <a:ext cx="32917916" cy="5487125"/>
-          </a:xfrm>
-          <a:prstGeom prst="rect">
-            <a:avLst/>
-          </a:prstGeom>
-          <a:noFill/>
-          <a:ln>
-            <a:noFill/>
-          </a:ln>
-        </p:spPr>
-        <p:txBody>
-          <a:bodyPr spcFirstLastPara="1" wrap="square" lIns="349525" tIns="174750" rIns="349525" bIns="174750" anchor="ctr" anchorCtr="0">
-            <a:noAutofit/>
-          </a:bodyPr>
-          <a:lstStyle>
-            <a:lvl1pPr lvl="0" algn="ctr">
-              <a:spcBef>
-                <a:spcPts val="0"/>
-              </a:spcBef>
-              <a:spcAft>
-                <a:spcPts val="0"/>
-              </a:spcAft>
-              <a:buSzPts val="1400"/>
-              <a:buNone/>
-              <a:defRPr/>
-            </a:lvl1pPr>
-            <a:lvl2pPr lvl="1" algn="ctr">
-              <a:spcBef>
-                <a:spcPts val="0"/>
-              </a:spcBef>
-              <a:spcAft>
-                <a:spcPts val="0"/>
-              </a:spcAft>
-              <a:buSzPts val="1400"/>
-              <a:buNone/>
-              <a:defRPr/>
-            </a:lvl2pPr>
-            <a:lvl3pPr lvl="2" algn="ctr">
-              <a:spcBef>
-                <a:spcPts val="0"/>
-              </a:spcBef>
-              <a:spcAft>
-                <a:spcPts val="0"/>
-              </a:spcAft>
-              <a:buSzPts val="1400"/>
-              <a:buNone/>
-              <a:defRPr/>
-            </a:lvl3pPr>
-            <a:lvl4pPr lvl="3" algn="ctr">
-              <a:spcBef>
-                <a:spcPts val="0"/>
-              </a:spcBef>
-              <a:spcAft>
-                <a:spcPts val="0"/>
-              </a:spcAft>
-              <a:buSzPts val="1400"/>
-              <a:buNone/>
-              <a:defRPr/>
-            </a:lvl4pPr>
-            <a:lvl5pPr lvl="4" algn="ctr">
-              <a:spcBef>
-                <a:spcPts val="0"/>
-              </a:spcBef>
-              <a:spcAft>
-                <a:spcPts val="0"/>
-              </a:spcAft>
-              <a:buSzPts val="1400"/>
-              <a:buNone/>
-              <a:defRPr/>
-            </a:lvl5pPr>
-            <a:lvl6pPr lvl="5" algn="ctr">
-              <a:spcBef>
-                <a:spcPts val="0"/>
-              </a:spcBef>
-              <a:spcAft>
-                <a:spcPts val="0"/>
-              </a:spcAft>
-              <a:buSzPts val="1400"/>
-              <a:buNone/>
-              <a:defRPr/>
-            </a:lvl6pPr>
-            <a:lvl7pPr lvl="6" algn="ctr">
-              <a:spcBef>
-                <a:spcPts val="0"/>
-              </a:spcBef>
-              <a:spcAft>
-                <a:spcPts val="0"/>
-              </a:spcAft>
-              <a:buSzPts val="1400"/>
-              <a:buNone/>
-              <a:defRPr/>
-            </a:lvl7pPr>
-            <a:lvl8pPr lvl="7" algn="ctr">
-              <a:spcBef>
-                <a:spcPts val="0"/>
-              </a:spcBef>
-              <a:spcAft>
-                <a:spcPts val="0"/>
-              </a:spcAft>
-              <a:buSzPts val="1400"/>
-              <a:buNone/>
-              <a:defRPr/>
-            </a:lvl8pPr>
-            <a:lvl9pPr lvl="8" algn="ctr">
-              <a:spcBef>
-                <a:spcPts val="0"/>
-              </a:spcBef>
-              <a:spcAft>
-                <a:spcPts val="0"/>
-              </a:spcAft>
-              <a:buSzPts val="1400"/>
-              <a:buNone/>
-              <a:defRPr/>
-            </a:lvl9pPr>
-          </a:lstStyle>
-          <a:p>
-            <a:endParaRPr/>
-          </a:p>
-        </p:txBody>
-      </p:sp>
-      <p:sp>
-        <p:nvSpPr>
-          <p:cNvPr id="27" name="Google Shape;27;p5"/>
-          <p:cNvSpPr txBox="1">
-            <a:spLocks noGrp="1"/>
-          </p:cNvSpPr>
-          <p:nvPr>
-            <p:ph type="body" idx="1"/>
-          </p:nvPr>
-        </p:nvSpPr>
-        <p:spPr>
-          <a:xfrm>
-            <a:off x="1829042" y="7680526"/>
-            <a:ext cx="32917916" cy="21724953"/>
-          </a:xfrm>
-          <a:prstGeom prst="rect">
-            <a:avLst/>
-          </a:prstGeom>
-          <a:noFill/>
-          <a:ln>
-            <a:noFill/>
-          </a:ln>
-        </p:spPr>
-        <p:txBody>
-          <a:bodyPr spcFirstLastPara="1" wrap="square" lIns="349525" tIns="174750" rIns="349525" bIns="174750" anchor="t" anchorCtr="0">
-            <a:noAutofit/>
-          </a:bodyPr>
-          <a:lstStyle>
-            <a:lvl1pPr marL="457200" lvl="0" indent="-342900" algn="l">
-              <a:spcBef>
-                <a:spcPts val="360"/>
-              </a:spcBef>
-              <a:spcAft>
-                <a:spcPts val="0"/>
-              </a:spcAft>
-              <a:buClr>
-                <a:schemeClr val="dk1"/>
-              </a:buClr>
-              <a:buSzPts val="1800"/>
-              <a:buChar char="•"/>
-              <a:defRPr/>
-            </a:lvl1pPr>
-            <a:lvl2pPr marL="914400" lvl="1" indent="-342900" algn="l">
-              <a:spcBef>
-                <a:spcPts val="360"/>
-              </a:spcBef>
-              <a:spcAft>
-                <a:spcPts val="0"/>
-              </a:spcAft>
-              <a:buClr>
-                <a:schemeClr val="dk1"/>
-              </a:buClr>
-              <a:buSzPts val="1800"/>
-              <a:buChar char="–"/>
-              <a:defRPr/>
-            </a:lvl2pPr>
-            <a:lvl3pPr marL="1371600" lvl="2" indent="-342900" algn="l">
-              <a:spcBef>
-                <a:spcPts val="360"/>
-              </a:spcBef>
-              <a:spcAft>
-                <a:spcPts val="0"/>
-              </a:spcAft>
-              <a:buClr>
-                <a:schemeClr val="dk1"/>
-              </a:buClr>
-              <a:buSzPts val="1800"/>
-              <a:buChar char="•"/>
-              <a:defRPr/>
-            </a:lvl3pPr>
-            <a:lvl4pPr marL="1828800" lvl="3" indent="-342900" algn="l">
-              <a:spcBef>
-                <a:spcPts val="360"/>
-              </a:spcBef>
-              <a:spcAft>
-                <a:spcPts val="0"/>
-              </a:spcAft>
-              <a:buClr>
-                <a:schemeClr val="dk1"/>
-              </a:buClr>
-              <a:buSzPts val="1800"/>
-              <a:buChar char="–"/>
-              <a:defRPr/>
-            </a:lvl4pPr>
-            <a:lvl5pPr marL="2286000" lvl="4" indent="-342900" algn="l">
-              <a:spcBef>
-                <a:spcPts val="360"/>
-              </a:spcBef>
-              <a:spcAft>
-                <a:spcPts val="0"/>
-              </a:spcAft>
-              <a:buClr>
-                <a:schemeClr val="dk1"/>
-              </a:buClr>
-              <a:buSzPts val="1800"/>
-              <a:buChar char="»"/>
-              <a:defRPr/>
-            </a:lvl5pPr>
-            <a:lvl6pPr marL="2743200" lvl="5" indent="-342900" algn="l">
-              <a:spcBef>
-                <a:spcPts val="360"/>
-              </a:spcBef>
-              <a:spcAft>
-                <a:spcPts val="0"/>
-              </a:spcAft>
-              <a:buClr>
-                <a:schemeClr val="dk1"/>
-              </a:buClr>
-              <a:buSzPts val="1800"/>
-              <a:buChar char="•"/>
-              <a:defRPr/>
-            </a:lvl6pPr>
-            <a:lvl7pPr marL="3200400" lvl="6" indent="-342900" algn="l">
-              <a:spcBef>
-                <a:spcPts val="360"/>
-              </a:spcBef>
-              <a:spcAft>
-                <a:spcPts val="0"/>
-              </a:spcAft>
-              <a:buClr>
-                <a:schemeClr val="dk1"/>
-              </a:buClr>
-              <a:buSzPts val="1800"/>
-              <a:buChar char="•"/>
-              <a:defRPr/>
-            </a:lvl7pPr>
-            <a:lvl8pPr marL="3657600" lvl="7" indent="-342900" algn="l">
-              <a:spcBef>
-                <a:spcPts val="360"/>
-              </a:spcBef>
-              <a:spcAft>
-                <a:spcPts val="0"/>
-              </a:spcAft>
-              <a:buClr>
-                <a:schemeClr val="dk1"/>
-              </a:buClr>
-              <a:buSzPts val="1800"/>
-              <a:buChar char="•"/>
-              <a:defRPr/>
-            </a:lvl8pPr>
-            <a:lvl9pPr marL="4114800" lvl="8" indent="-342900" algn="l">
-              <a:spcBef>
-                <a:spcPts val="360"/>
-              </a:spcBef>
-              <a:spcAft>
-                <a:spcPts val="0"/>
-              </a:spcAft>
-              <a:buClr>
-                <a:schemeClr val="dk1"/>
-              </a:buClr>
-              <a:buSzPts val="1800"/>
-              <a:buChar char="•"/>
-              <a:defRPr/>
-            </a:lvl9pPr>
-          </a:lstStyle>
-          <a:p>
-            <a:endParaRPr/>
-          </a:p>
-        </p:txBody>
-      </p:sp>
-      <p:sp>
-        <p:nvSpPr>
-          <p:cNvPr id="28" name="Google Shape;28;p5"/>
-          <p:cNvSpPr txBox="1">
-            <a:spLocks noGrp="1"/>
-          </p:cNvSpPr>
-          <p:nvPr>
-            <p:ph type="dt" idx="10"/>
-          </p:nvPr>
-        </p:nvSpPr>
-        <p:spPr>
-          <a:xfrm>
-            <a:off x="1829043" y="30510162"/>
-            <a:ext cx="8533917" cy="1753557"/>
-          </a:xfrm>
-          <a:prstGeom prst="rect">
-            <a:avLst/>
-          </a:prstGeom>
-          <a:noFill/>
-          <a:ln>
-            <a:noFill/>
-          </a:ln>
-        </p:spPr>
-        <p:txBody>
-          <a:bodyPr spcFirstLastPara="1" wrap="square" lIns="349525" tIns="174750" rIns="349525" bIns="174750" anchor="ctr" anchorCtr="0">
-            <a:noAutofit/>
-          </a:bodyPr>
-          <a:lstStyle>
-            <a:lvl1pPr lvl="0" algn="l">
-              <a:spcBef>
-                <a:spcPts val="0"/>
-              </a:spcBef>
-              <a:spcAft>
-                <a:spcPts val="0"/>
-              </a:spcAft>
-              <a:buSzPts val="1400"/>
-              <a:buNone/>
-              <a:defRPr/>
-            </a:lvl1pPr>
-            <a:lvl2pPr lvl="1" algn="l">
-              <a:spcBef>
-                <a:spcPts val="0"/>
-              </a:spcBef>
-              <a:spcAft>
-                <a:spcPts val="0"/>
-              </a:spcAft>
-              <a:buSzPts val="1400"/>
-              <a:buNone/>
-              <a:defRPr/>
-            </a:lvl2pPr>
-            <a:lvl3pPr lvl="2" algn="l">
-              <a:spcBef>
-                <a:spcPts val="0"/>
-              </a:spcBef>
-              <a:spcAft>
-                <a:spcPts val="0"/>
-              </a:spcAft>
-              <a:buSzPts val="1400"/>
-              <a:buNone/>
-              <a:defRPr/>
-            </a:lvl3pPr>
-            <a:lvl4pPr lvl="3" algn="l">
-              <a:spcBef>
-                <a:spcPts val="0"/>
-              </a:spcBef>
-              <a:spcAft>
-                <a:spcPts val="0"/>
-              </a:spcAft>
-              <a:buSzPts val="1400"/>
-              <a:buNone/>
-              <a:defRPr/>
-            </a:lvl4pPr>
-            <a:lvl5pPr lvl="4" algn="l">
-              <a:spcBef>
-                <a:spcPts val="0"/>
-              </a:spcBef>
-              <a:spcAft>
-                <a:spcPts val="0"/>
-              </a:spcAft>
-              <a:buSzPts val="1400"/>
-              <a:buNone/>
-              <a:defRPr/>
-            </a:lvl5pPr>
-            <a:lvl6pPr lvl="5" algn="l">
-              <a:spcBef>
-                <a:spcPts val="0"/>
-              </a:spcBef>
-              <a:spcAft>
-                <a:spcPts val="0"/>
-              </a:spcAft>
-              <a:buSzPts val="1400"/>
-              <a:buNone/>
-              <a:defRPr/>
-            </a:lvl6pPr>
-            <a:lvl7pPr lvl="6" algn="l">
-              <a:spcBef>
-                <a:spcPts val="0"/>
-              </a:spcBef>
-              <a:spcAft>
-                <a:spcPts val="0"/>
-              </a:spcAft>
-              <a:buSzPts val="1400"/>
-              <a:buNone/>
-              <a:defRPr/>
-            </a:lvl7pPr>
-            <a:lvl8pPr lvl="7" algn="l">
-              <a:spcBef>
-                <a:spcPts val="0"/>
-              </a:spcBef>
-              <a:spcAft>
-                <a:spcPts val="0"/>
-              </a:spcAft>
-              <a:buSzPts val="1400"/>
-              <a:buNone/>
-              <a:defRPr/>
-            </a:lvl8pPr>
-            <a:lvl9pPr lvl="8" algn="l">
-              <a:spcBef>
-                <a:spcPts val="0"/>
-              </a:spcBef>
-              <a:spcAft>
-                <a:spcPts val="0"/>
-              </a:spcAft>
-              <a:buSzPts val="1400"/>
-              <a:buNone/>
-              <a:defRPr/>
-            </a:lvl9pPr>
-          </a:lstStyle>
-          <a:p>
-            <a:endParaRPr/>
-          </a:p>
-        </p:txBody>
-      </p:sp>
-      <p:sp>
-        <p:nvSpPr>
-          <p:cNvPr id="29" name="Google Shape;29;p5"/>
-          <p:cNvSpPr txBox="1">
-            <a:spLocks noGrp="1"/>
-          </p:cNvSpPr>
-          <p:nvPr>
-            <p:ph type="ftr" idx="11"/>
-          </p:nvPr>
-        </p:nvSpPr>
-        <p:spPr>
-          <a:xfrm>
-            <a:off x="12496840" y="30510162"/>
-            <a:ext cx="11582320" cy="1753557"/>
-          </a:xfrm>
-          <a:prstGeom prst="rect">
-            <a:avLst/>
-          </a:prstGeom>
-          <a:noFill/>
-          <a:ln>
-            <a:noFill/>
-          </a:ln>
-        </p:spPr>
-        <p:txBody>
-          <a:bodyPr spcFirstLastPara="1" wrap="square" lIns="349525" tIns="174750" rIns="349525" bIns="174750" anchor="ctr" anchorCtr="0">
-            <a:noAutofit/>
-          </a:bodyPr>
-          <a:lstStyle>
-            <a:lvl1pPr lvl="0" algn="ctr">
-              <a:spcBef>
-                <a:spcPts val="0"/>
-              </a:spcBef>
-              <a:spcAft>
-                <a:spcPts val="0"/>
-              </a:spcAft>
-              <a:buSzPts val="1400"/>
-              <a:buNone/>
-              <a:defRPr/>
-            </a:lvl1pPr>
-            <a:lvl2pPr lvl="1" algn="l">
-              <a:spcBef>
-                <a:spcPts val="0"/>
-              </a:spcBef>
-              <a:spcAft>
-                <a:spcPts val="0"/>
-              </a:spcAft>
-              <a:buSzPts val="1400"/>
-              <a:buNone/>
-              <a:defRPr/>
-            </a:lvl2pPr>
-            <a:lvl3pPr lvl="2" algn="l">
-              <a:spcBef>
-                <a:spcPts val="0"/>
-              </a:spcBef>
-              <a:spcAft>
-                <a:spcPts val="0"/>
-              </a:spcAft>
-              <a:buSzPts val="1400"/>
-              <a:buNone/>
-              <a:defRPr/>
-            </a:lvl3pPr>
-            <a:lvl4pPr lvl="3" algn="l">
-              <a:spcBef>
-                <a:spcPts val="0"/>
-              </a:spcBef>
-              <a:spcAft>
-                <a:spcPts val="0"/>
-              </a:spcAft>
-              <a:buSzPts val="1400"/>
-              <a:buNone/>
-              <a:defRPr/>
-            </a:lvl4pPr>
-            <a:lvl5pPr lvl="4" algn="l">
-              <a:spcBef>
-                <a:spcPts val="0"/>
-              </a:spcBef>
-              <a:spcAft>
-                <a:spcPts val="0"/>
-              </a:spcAft>
-              <a:buSzPts val="1400"/>
-              <a:buNone/>
-              <a:defRPr/>
-            </a:lvl5pPr>
-            <a:lvl6pPr lvl="5" algn="l">
-              <a:spcBef>
-                <a:spcPts val="0"/>
-              </a:spcBef>
-              <a:spcAft>
-                <a:spcPts val="0"/>
-              </a:spcAft>
-              <a:buSzPts val="1400"/>
-              <a:buNone/>
-              <a:defRPr/>
-            </a:lvl6pPr>
-            <a:lvl7pPr lvl="6" algn="l">
-              <a:spcBef>
-                <a:spcPts val="0"/>
-              </a:spcBef>
-              <a:spcAft>
-                <a:spcPts val="0"/>
-              </a:spcAft>
-              <a:buSzPts val="1400"/>
-              <a:buNone/>
-              <a:defRPr/>
-            </a:lvl7pPr>
-            <a:lvl8pPr lvl="7" algn="l">
-              <a:spcBef>
-                <a:spcPts val="0"/>
-              </a:spcBef>
-              <a:spcAft>
-                <a:spcPts val="0"/>
-              </a:spcAft>
-              <a:buSzPts val="1400"/>
-              <a:buNone/>
-              <a:defRPr/>
-            </a:lvl8pPr>
-            <a:lvl9pPr lvl="8" algn="l">
-              <a:spcBef>
-                <a:spcPts val="0"/>
-              </a:spcBef>
-              <a:spcAft>
-                <a:spcPts val="0"/>
-              </a:spcAft>
-              <a:buSzPts val="1400"/>
-              <a:buNone/>
-              <a:defRPr/>
-            </a:lvl9pPr>
-          </a:lstStyle>
-          <a:p>
-            <a:endParaRPr/>
-          </a:p>
-        </p:txBody>
-      </p:sp>
-      <p:sp>
-        <p:nvSpPr>
-          <p:cNvPr id="30" name="Google Shape;30;p5"/>
-          <p:cNvSpPr txBox="1">
-            <a:spLocks noGrp="1"/>
-          </p:cNvSpPr>
-          <p:nvPr>
-            <p:ph type="sldNum" idx="12"/>
-          </p:nvPr>
-        </p:nvSpPr>
-        <p:spPr>
-          <a:xfrm>
-            <a:off x="26213043" y="30510162"/>
-            <a:ext cx="8533917" cy="1753557"/>
-          </a:xfrm>
-          <a:prstGeom prst="rect">
-            <a:avLst/>
-          </a:prstGeom>
-          <a:noFill/>
-          <a:ln>
-            <a:noFill/>
-          </a:ln>
-        </p:spPr>
-        <p:txBody>
-          <a:bodyPr spcFirstLastPara="1" wrap="square" lIns="349525" tIns="174750" rIns="349525" bIns="174750" anchor="ctr" anchorCtr="0">
-            <a:noAutofit/>
-          </a:bodyPr>
-          <a:lstStyle>
-            <a:lvl1pPr marL="0" marR="0" lvl="0" indent="0" algn="r">
-              <a:spcBef>
-                <a:spcPts val="0"/>
-              </a:spcBef>
-              <a:spcAft>
-                <a:spcPts val="0"/>
-              </a:spcAft>
-              <a:buNone/>
-              <a:defRPr sz="4674" b="0" i="0" u="none" strike="noStrike" cap="none">
-                <a:solidFill>
-                  <a:srgbClr val="888888"/>
-                </a:solidFill>
-                <a:latin typeface="Calibri"/>
-                <a:ea typeface="Calibri"/>
-                <a:cs typeface="Calibri"/>
-                <a:sym typeface="Calibri"/>
-              </a:defRPr>
-            </a:lvl1pPr>
-            <a:lvl2pPr marL="0" marR="0" lvl="1" indent="0" algn="r">
-              <a:spcBef>
-                <a:spcPts val="0"/>
-              </a:spcBef>
-              <a:spcAft>
-                <a:spcPts val="0"/>
-              </a:spcAft>
-              <a:buNone/>
-              <a:defRPr sz="4674" b="0" i="0" u="none" strike="noStrike" cap="none">
-                <a:solidFill>
-                  <a:srgbClr val="888888"/>
-                </a:solidFill>
-                <a:latin typeface="Calibri"/>
-                <a:ea typeface="Calibri"/>
-                <a:cs typeface="Calibri"/>
-                <a:sym typeface="Calibri"/>
-              </a:defRPr>
-            </a:lvl2pPr>
-            <a:lvl3pPr marL="0" marR="0" lvl="2" indent="0" algn="r">
-              <a:spcBef>
-                <a:spcPts val="0"/>
-              </a:spcBef>
-              <a:spcAft>
-                <a:spcPts val="0"/>
-              </a:spcAft>
-              <a:buNone/>
-              <a:defRPr sz="4674" b="0" i="0" u="none" strike="noStrike" cap="none">
-                <a:solidFill>
-                  <a:srgbClr val="888888"/>
-                </a:solidFill>
-                <a:latin typeface="Calibri"/>
-                <a:ea typeface="Calibri"/>
-                <a:cs typeface="Calibri"/>
-                <a:sym typeface="Calibri"/>
-              </a:defRPr>
-            </a:lvl3pPr>
-            <a:lvl4pPr marL="0" marR="0" lvl="3" indent="0" algn="r">
-              <a:spcBef>
-                <a:spcPts val="0"/>
-              </a:spcBef>
-              <a:spcAft>
-                <a:spcPts val="0"/>
-              </a:spcAft>
-              <a:buNone/>
-              <a:defRPr sz="4674" b="0" i="0" u="none" strike="noStrike" cap="none">
-                <a:solidFill>
-                  <a:srgbClr val="888888"/>
-                </a:solidFill>
-                <a:latin typeface="Calibri"/>
-                <a:ea typeface="Calibri"/>
-                <a:cs typeface="Calibri"/>
-                <a:sym typeface="Calibri"/>
-              </a:defRPr>
-            </a:lvl4pPr>
-            <a:lvl5pPr marL="0" marR="0" lvl="4" indent="0" algn="r">
-              <a:spcBef>
-                <a:spcPts val="0"/>
-              </a:spcBef>
-              <a:spcAft>
-                <a:spcPts val="0"/>
-              </a:spcAft>
-              <a:buNone/>
-              <a:defRPr sz="4674" b="0" i="0" u="none" strike="noStrike" cap="none">
-                <a:solidFill>
-                  <a:srgbClr val="888888"/>
-                </a:solidFill>
-                <a:latin typeface="Calibri"/>
-                <a:ea typeface="Calibri"/>
-                <a:cs typeface="Calibri"/>
-                <a:sym typeface="Calibri"/>
-              </a:defRPr>
-            </a:lvl5pPr>
-            <a:lvl6pPr marL="0" marR="0" lvl="5" indent="0" algn="r">
-              <a:spcBef>
-                <a:spcPts val="0"/>
-              </a:spcBef>
-              <a:spcAft>
-                <a:spcPts val="0"/>
-              </a:spcAft>
-              <a:buNone/>
-              <a:defRPr sz="4674" b="0" i="0" u="none" strike="noStrike" cap="none">
-                <a:solidFill>
-                  <a:srgbClr val="888888"/>
-                </a:solidFill>
-                <a:latin typeface="Calibri"/>
-                <a:ea typeface="Calibri"/>
-                <a:cs typeface="Calibri"/>
-                <a:sym typeface="Calibri"/>
-              </a:defRPr>
-            </a:lvl6pPr>
-            <a:lvl7pPr marL="0" marR="0" lvl="6" indent="0" algn="r">
-              <a:spcBef>
-                <a:spcPts val="0"/>
-              </a:spcBef>
-              <a:spcAft>
-                <a:spcPts val="0"/>
-              </a:spcAft>
-              <a:buNone/>
-              <a:defRPr sz="4674" b="0" i="0" u="none" strike="noStrike" cap="none">
-                <a:solidFill>
-                  <a:srgbClr val="888888"/>
-                </a:solidFill>
-                <a:latin typeface="Calibri"/>
-                <a:ea typeface="Calibri"/>
-                <a:cs typeface="Calibri"/>
-                <a:sym typeface="Calibri"/>
-              </a:defRPr>
-            </a:lvl7pPr>
-            <a:lvl8pPr marL="0" marR="0" lvl="7" indent="0" algn="r">
-              <a:spcBef>
-                <a:spcPts val="0"/>
-              </a:spcBef>
-              <a:spcAft>
-                <a:spcPts val="0"/>
-              </a:spcAft>
-              <a:buNone/>
-              <a:defRPr sz="4674" b="0" i="0" u="none" strike="noStrike" cap="none">
-                <a:solidFill>
-                  <a:srgbClr val="888888"/>
-                </a:solidFill>
-                <a:latin typeface="Calibri"/>
-                <a:ea typeface="Calibri"/>
-                <a:cs typeface="Calibri"/>
-                <a:sym typeface="Calibri"/>
-              </a:defRPr>
-            </a:lvl8pPr>
-            <a:lvl9pPr marL="0" marR="0" lvl="8" indent="0" algn="r">
-              <a:spcBef>
-                <a:spcPts val="0"/>
-              </a:spcBef>
-              <a:spcAft>
-                <a:spcPts val="0"/>
-              </a:spcAft>
-              <a:buNone/>
-              <a:defRPr sz="4674" b="0" i="0" u="none" strike="noStrike" cap="none">
-                <a:solidFill>
-                  <a:srgbClr val="888888"/>
-                </a:solidFill>
-                <a:latin typeface="Calibri"/>
-                <a:ea typeface="Calibri"/>
-                <a:cs typeface="Calibri"/>
-                <a:sym typeface="Calibri"/>
-              </a:defRPr>
-            </a:lvl9pPr>
-          </a:lstStyle>
-          <a:p>
-            <a:pPr marL="0" lvl="0" indent="0" algn="r" rtl="0">
-              <a:spcBef>
-                <a:spcPts val="0"/>
-              </a:spcBef>
-              <a:spcAft>
-                <a:spcPts val="0"/>
-              </a:spcAft>
-              <a:buNone/>
-            </a:pPr>
-            <a:fld id="{00000000-1234-1234-1234-123412341234}" type="slidenum">
-              <a:rPr lang="en-US"/>
-              <a:t>‹#›</a:t>
-            </a:fld>
-            <a:endParaRPr/>
-          </a:p>
-        </p:txBody>
-      </p:sp>
-    </p:spTree>
-  </p:cSld>
-  <p:clrMapOvr>
-    <a:masterClrMapping/>
-  </p:clrMapOvr>
-</p:sldLayout>
-</file>
-
-<file path=ppt/slideLayouts/slideLayout3.xml><?xml version="1.0" encoding="utf-8"?>
 <p:sldLayout xmlns:a="http://schemas.openxmlformats.org/drawingml/2006/main" xmlns:r="http://schemas.openxmlformats.org/officeDocument/2006/relationships" xmlns:p="http://schemas.openxmlformats.org/presentationml/2006/main" matchingName="Section Header" type="secHead">
   <p:cSld name="SECTION_HEADER">
     <p:spTree>
@@ -4762,7 +3385,7 @@
 </p:sldLayout>
 </file>
 
-<file path=ppt/slideLayouts/slideLayout4.xml><?xml version="1.0" encoding="utf-8"?>
+<file path=ppt/slideLayouts/slideLayout3.xml><?xml version="1.0" encoding="utf-8"?>
 <p:sldLayout xmlns:a="http://schemas.openxmlformats.org/drawingml/2006/main" xmlns:r="http://schemas.openxmlformats.org/officeDocument/2006/relationships" xmlns:p="http://schemas.openxmlformats.org/presentationml/2006/main" matchingName="Two Content" type="twoObj">
   <p:cSld name="TWO_OBJECTS">
     <p:spTree>
@@ -5715,7 +4338,7 @@
 </p:sldLayout>
 </file>
 
-<file path=ppt/slideLayouts/slideLayout5.xml><?xml version="1.0" encoding="utf-8"?>
+<file path=ppt/slideLayouts/slideLayout4.xml><?xml version="1.0" encoding="utf-8"?>
 <p:sldLayout xmlns:a="http://schemas.openxmlformats.org/drawingml/2006/main" xmlns:r="http://schemas.openxmlformats.org/officeDocument/2006/relationships" xmlns:p="http://schemas.openxmlformats.org/presentationml/2006/main" matchingName="Comparison" type="twoTxTwoObj">
   <p:cSld name="TWO_OBJECTS_WITH_TEXT">
     <p:spTree>
@@ -6988,7 +5611,7 @@
 </p:sldLayout>
 </file>
 
-<file path=ppt/slideLayouts/slideLayout6.xml><?xml version="1.0" encoding="utf-8"?>
+<file path=ppt/slideLayouts/slideLayout5.xml><?xml version="1.0" encoding="utf-8"?>
 <p:sldLayout xmlns:a="http://schemas.openxmlformats.org/drawingml/2006/main" xmlns:r="http://schemas.openxmlformats.org/officeDocument/2006/relationships" xmlns:p="http://schemas.openxmlformats.org/presentationml/2006/main" matchingName="Title Only" type="titleOnly">
   <p:cSld name="TITLE_ONLY">
     <p:spTree>
@@ -7621,7 +6244,7 @@
 </p:sldLayout>
 </file>
 
-<file path=ppt/slideLayouts/slideLayout7.xml><?xml version="1.0" encoding="utf-8"?>
+<file path=ppt/slideLayouts/slideLayout6.xml><?xml version="1.0" encoding="utf-8"?>
 <p:sldLayout xmlns:a="http://schemas.openxmlformats.org/drawingml/2006/main" xmlns:r="http://schemas.openxmlformats.org/officeDocument/2006/relationships" xmlns:p="http://schemas.openxmlformats.org/presentationml/2006/main" matchingName="Content with Caption" type="objTx">
   <p:cSld name="OBJECT_WITH_CAPTION_TEXT">
     <p:spTree>
@@ -8574,7 +7197,7 @@
 </p:sldLayout>
 </file>
 
-<file path=ppt/slideLayouts/slideLayout8.xml><?xml version="1.0" encoding="utf-8"?>
+<file path=ppt/slideLayouts/slideLayout7.xml><?xml version="1.0" encoding="utf-8"?>
 <p:sldLayout xmlns:a="http://schemas.openxmlformats.org/drawingml/2006/main" xmlns:r="http://schemas.openxmlformats.org/officeDocument/2006/relationships" xmlns:p="http://schemas.openxmlformats.org/presentationml/2006/main" matchingName="Picture with Caption" type="picTx">
   <p:cSld name="PICTURE_WITH_CAPTION_TEXT">
     <p:spTree>
@@ -9391,7 +8014,7 @@
 </p:sldLayout>
 </file>
 
-<file path=ppt/slideLayouts/slideLayout9.xml><?xml version="1.0" encoding="utf-8"?>
+<file path=ppt/slideLayouts/slideLayout8.xml><?xml version="1.0" encoding="utf-8"?>
 <p:sldLayout xmlns:a="http://schemas.openxmlformats.org/drawingml/2006/main" xmlns:r="http://schemas.openxmlformats.org/officeDocument/2006/relationships" xmlns:p="http://schemas.openxmlformats.org/presentationml/2006/main" matchingName="Title and Vertical Text" type="vertTx">
   <p:cSld name="VERTICAL_TEXT">
     <p:spTree>
@@ -9970,6 +8593,799 @@
       <p:sp>
         <p:nvSpPr>
           <p:cNvPr id="77" name="Google Shape;77;p12"/>
+          <p:cNvSpPr txBox="1">
+            <a:spLocks noGrp="1"/>
+          </p:cNvSpPr>
+          <p:nvPr>
+            <p:ph type="sldNum" idx="12"/>
+          </p:nvPr>
+        </p:nvSpPr>
+        <p:spPr>
+          <a:xfrm>
+            <a:off x="26213043" y="30510162"/>
+            <a:ext cx="8533917" cy="1753557"/>
+          </a:xfrm>
+          <a:prstGeom prst="rect">
+            <a:avLst/>
+          </a:prstGeom>
+          <a:noFill/>
+          <a:ln>
+            <a:noFill/>
+          </a:ln>
+        </p:spPr>
+        <p:txBody>
+          <a:bodyPr spcFirstLastPara="1" wrap="square" lIns="349525" tIns="174750" rIns="349525" bIns="174750" anchor="ctr" anchorCtr="0">
+            <a:noAutofit/>
+          </a:bodyPr>
+          <a:lstStyle>
+            <a:lvl1pPr marL="0" marR="0" lvl="0" indent="0" algn="r">
+              <a:spcBef>
+                <a:spcPts val="0"/>
+              </a:spcBef>
+              <a:spcAft>
+                <a:spcPts val="0"/>
+              </a:spcAft>
+              <a:buNone/>
+              <a:defRPr sz="4674" b="0" i="0" u="none" strike="noStrike" cap="none">
+                <a:solidFill>
+                  <a:srgbClr val="888888"/>
+                </a:solidFill>
+                <a:latin typeface="Calibri"/>
+                <a:ea typeface="Calibri"/>
+                <a:cs typeface="Calibri"/>
+                <a:sym typeface="Calibri"/>
+              </a:defRPr>
+            </a:lvl1pPr>
+            <a:lvl2pPr marL="0" marR="0" lvl="1" indent="0" algn="r">
+              <a:spcBef>
+                <a:spcPts val="0"/>
+              </a:spcBef>
+              <a:spcAft>
+                <a:spcPts val="0"/>
+              </a:spcAft>
+              <a:buNone/>
+              <a:defRPr sz="4674" b="0" i="0" u="none" strike="noStrike" cap="none">
+                <a:solidFill>
+                  <a:srgbClr val="888888"/>
+                </a:solidFill>
+                <a:latin typeface="Calibri"/>
+                <a:ea typeface="Calibri"/>
+                <a:cs typeface="Calibri"/>
+                <a:sym typeface="Calibri"/>
+              </a:defRPr>
+            </a:lvl2pPr>
+            <a:lvl3pPr marL="0" marR="0" lvl="2" indent="0" algn="r">
+              <a:spcBef>
+                <a:spcPts val="0"/>
+              </a:spcBef>
+              <a:spcAft>
+                <a:spcPts val="0"/>
+              </a:spcAft>
+              <a:buNone/>
+              <a:defRPr sz="4674" b="0" i="0" u="none" strike="noStrike" cap="none">
+                <a:solidFill>
+                  <a:srgbClr val="888888"/>
+                </a:solidFill>
+                <a:latin typeface="Calibri"/>
+                <a:ea typeface="Calibri"/>
+                <a:cs typeface="Calibri"/>
+                <a:sym typeface="Calibri"/>
+              </a:defRPr>
+            </a:lvl3pPr>
+            <a:lvl4pPr marL="0" marR="0" lvl="3" indent="0" algn="r">
+              <a:spcBef>
+                <a:spcPts val="0"/>
+              </a:spcBef>
+              <a:spcAft>
+                <a:spcPts val="0"/>
+              </a:spcAft>
+              <a:buNone/>
+              <a:defRPr sz="4674" b="0" i="0" u="none" strike="noStrike" cap="none">
+                <a:solidFill>
+                  <a:srgbClr val="888888"/>
+                </a:solidFill>
+                <a:latin typeface="Calibri"/>
+                <a:ea typeface="Calibri"/>
+                <a:cs typeface="Calibri"/>
+                <a:sym typeface="Calibri"/>
+              </a:defRPr>
+            </a:lvl4pPr>
+            <a:lvl5pPr marL="0" marR="0" lvl="4" indent="0" algn="r">
+              <a:spcBef>
+                <a:spcPts val="0"/>
+              </a:spcBef>
+              <a:spcAft>
+                <a:spcPts val="0"/>
+              </a:spcAft>
+              <a:buNone/>
+              <a:defRPr sz="4674" b="0" i="0" u="none" strike="noStrike" cap="none">
+                <a:solidFill>
+                  <a:srgbClr val="888888"/>
+                </a:solidFill>
+                <a:latin typeface="Calibri"/>
+                <a:ea typeface="Calibri"/>
+                <a:cs typeface="Calibri"/>
+                <a:sym typeface="Calibri"/>
+              </a:defRPr>
+            </a:lvl5pPr>
+            <a:lvl6pPr marL="0" marR="0" lvl="5" indent="0" algn="r">
+              <a:spcBef>
+                <a:spcPts val="0"/>
+              </a:spcBef>
+              <a:spcAft>
+                <a:spcPts val="0"/>
+              </a:spcAft>
+              <a:buNone/>
+              <a:defRPr sz="4674" b="0" i="0" u="none" strike="noStrike" cap="none">
+                <a:solidFill>
+                  <a:srgbClr val="888888"/>
+                </a:solidFill>
+                <a:latin typeface="Calibri"/>
+                <a:ea typeface="Calibri"/>
+                <a:cs typeface="Calibri"/>
+                <a:sym typeface="Calibri"/>
+              </a:defRPr>
+            </a:lvl6pPr>
+            <a:lvl7pPr marL="0" marR="0" lvl="6" indent="0" algn="r">
+              <a:spcBef>
+                <a:spcPts val="0"/>
+              </a:spcBef>
+              <a:spcAft>
+                <a:spcPts val="0"/>
+              </a:spcAft>
+              <a:buNone/>
+              <a:defRPr sz="4674" b="0" i="0" u="none" strike="noStrike" cap="none">
+                <a:solidFill>
+                  <a:srgbClr val="888888"/>
+                </a:solidFill>
+                <a:latin typeface="Calibri"/>
+                <a:ea typeface="Calibri"/>
+                <a:cs typeface="Calibri"/>
+                <a:sym typeface="Calibri"/>
+              </a:defRPr>
+            </a:lvl7pPr>
+            <a:lvl8pPr marL="0" marR="0" lvl="7" indent="0" algn="r">
+              <a:spcBef>
+                <a:spcPts val="0"/>
+              </a:spcBef>
+              <a:spcAft>
+                <a:spcPts val="0"/>
+              </a:spcAft>
+              <a:buNone/>
+              <a:defRPr sz="4674" b="0" i="0" u="none" strike="noStrike" cap="none">
+                <a:solidFill>
+                  <a:srgbClr val="888888"/>
+                </a:solidFill>
+                <a:latin typeface="Calibri"/>
+                <a:ea typeface="Calibri"/>
+                <a:cs typeface="Calibri"/>
+                <a:sym typeface="Calibri"/>
+              </a:defRPr>
+            </a:lvl8pPr>
+            <a:lvl9pPr marL="0" marR="0" lvl="8" indent="0" algn="r">
+              <a:spcBef>
+                <a:spcPts val="0"/>
+              </a:spcBef>
+              <a:spcAft>
+                <a:spcPts val="0"/>
+              </a:spcAft>
+              <a:buNone/>
+              <a:defRPr sz="4674" b="0" i="0" u="none" strike="noStrike" cap="none">
+                <a:solidFill>
+                  <a:srgbClr val="888888"/>
+                </a:solidFill>
+                <a:latin typeface="Calibri"/>
+                <a:ea typeface="Calibri"/>
+                <a:cs typeface="Calibri"/>
+                <a:sym typeface="Calibri"/>
+              </a:defRPr>
+            </a:lvl9pPr>
+          </a:lstStyle>
+          <a:p>
+            <a:pPr marL="0" lvl="0" indent="0" algn="r" rtl="0">
+              <a:spcBef>
+                <a:spcPts val="0"/>
+              </a:spcBef>
+              <a:spcAft>
+                <a:spcPts val="0"/>
+              </a:spcAft>
+              <a:buNone/>
+            </a:pPr>
+            <a:fld id="{00000000-1234-1234-1234-123412341234}" type="slidenum">
+              <a:rPr lang="en-US"/>
+              <a:t>‹#›</a:t>
+            </a:fld>
+            <a:endParaRPr/>
+          </a:p>
+        </p:txBody>
+      </p:sp>
+    </p:spTree>
+  </p:cSld>
+  <p:clrMapOvr>
+    <a:masterClrMapping/>
+  </p:clrMapOvr>
+</p:sldLayout>
+</file>
+
+<file path=ppt/slideLayouts/slideLayout9.xml><?xml version="1.0" encoding="utf-8"?>
+<p:sldLayout xmlns:a="http://schemas.openxmlformats.org/drawingml/2006/main" xmlns:r="http://schemas.openxmlformats.org/officeDocument/2006/relationships" xmlns:p="http://schemas.openxmlformats.org/presentationml/2006/main" matchingName="Vertical Title and Text" type="vertTitleAndTx">
+  <p:cSld name="VERTICAL_TITLE_AND_VERTICAL_TEXT">
+    <p:spTree>
+      <p:nvGrpSpPr>
+        <p:cNvPr id="1" name="Shape 78"/>
+        <p:cNvGrpSpPr/>
+        <p:nvPr/>
+      </p:nvGrpSpPr>
+      <p:grpSpPr>
+        <a:xfrm>
+          <a:off x="0" y="0"/>
+          <a:ext cx="0" cy="0"/>
+          <a:chOff x="0" y="0"/>
+          <a:chExt cx="0" cy="0"/>
+        </a:xfrm>
+      </p:grpSpPr>
+      <p:sp>
+        <p:nvSpPr>
+          <p:cNvPr id="79" name="Google Shape;79;p13"/>
+          <p:cNvSpPr txBox="1">
+            <a:spLocks noGrp="1"/>
+          </p:cNvSpPr>
+          <p:nvPr>
+            <p:ph type="title"/>
+          </p:nvPr>
+        </p:nvSpPr>
+        <p:spPr>
+          <a:xfrm rot="5400000">
+            <a:off x="85751673" y="53160931"/>
+            <a:ext cx="134820662" cy="41148001"/>
+          </a:xfrm>
+          <a:prstGeom prst="rect">
+            <a:avLst/>
+          </a:prstGeom>
+          <a:noFill/>
+          <a:ln>
+            <a:noFill/>
+          </a:ln>
+        </p:spPr>
+        <p:txBody>
+          <a:bodyPr spcFirstLastPara="1" wrap="square" lIns="349525" tIns="174750" rIns="349525" bIns="174750" anchor="ctr" anchorCtr="0">
+            <a:noAutofit/>
+          </a:bodyPr>
+          <a:lstStyle>
+            <a:lvl1pPr lvl="0" algn="ctr">
+              <a:spcBef>
+                <a:spcPts val="0"/>
+              </a:spcBef>
+              <a:spcAft>
+                <a:spcPts val="0"/>
+              </a:spcAft>
+              <a:buSzPts val="1400"/>
+              <a:buNone/>
+              <a:defRPr/>
+            </a:lvl1pPr>
+            <a:lvl2pPr lvl="1" algn="ctr">
+              <a:spcBef>
+                <a:spcPts val="0"/>
+              </a:spcBef>
+              <a:spcAft>
+                <a:spcPts val="0"/>
+              </a:spcAft>
+              <a:buSzPts val="1400"/>
+              <a:buNone/>
+              <a:defRPr/>
+            </a:lvl2pPr>
+            <a:lvl3pPr lvl="2" algn="ctr">
+              <a:spcBef>
+                <a:spcPts val="0"/>
+              </a:spcBef>
+              <a:spcAft>
+                <a:spcPts val="0"/>
+              </a:spcAft>
+              <a:buSzPts val="1400"/>
+              <a:buNone/>
+              <a:defRPr/>
+            </a:lvl3pPr>
+            <a:lvl4pPr lvl="3" algn="ctr">
+              <a:spcBef>
+                <a:spcPts val="0"/>
+              </a:spcBef>
+              <a:spcAft>
+                <a:spcPts val="0"/>
+              </a:spcAft>
+              <a:buSzPts val="1400"/>
+              <a:buNone/>
+              <a:defRPr/>
+            </a:lvl4pPr>
+            <a:lvl5pPr lvl="4" algn="ctr">
+              <a:spcBef>
+                <a:spcPts val="0"/>
+              </a:spcBef>
+              <a:spcAft>
+                <a:spcPts val="0"/>
+              </a:spcAft>
+              <a:buSzPts val="1400"/>
+              <a:buNone/>
+              <a:defRPr/>
+            </a:lvl5pPr>
+            <a:lvl6pPr lvl="5" algn="ctr">
+              <a:spcBef>
+                <a:spcPts val="0"/>
+              </a:spcBef>
+              <a:spcAft>
+                <a:spcPts val="0"/>
+              </a:spcAft>
+              <a:buSzPts val="1400"/>
+              <a:buNone/>
+              <a:defRPr/>
+            </a:lvl6pPr>
+            <a:lvl7pPr lvl="6" algn="ctr">
+              <a:spcBef>
+                <a:spcPts val="0"/>
+              </a:spcBef>
+              <a:spcAft>
+                <a:spcPts val="0"/>
+              </a:spcAft>
+              <a:buSzPts val="1400"/>
+              <a:buNone/>
+              <a:defRPr/>
+            </a:lvl7pPr>
+            <a:lvl8pPr lvl="7" algn="ctr">
+              <a:spcBef>
+                <a:spcPts val="0"/>
+              </a:spcBef>
+              <a:spcAft>
+                <a:spcPts val="0"/>
+              </a:spcAft>
+              <a:buSzPts val="1400"/>
+              <a:buNone/>
+              <a:defRPr/>
+            </a:lvl8pPr>
+            <a:lvl9pPr lvl="8" algn="ctr">
+              <a:spcBef>
+                <a:spcPts val="0"/>
+              </a:spcBef>
+              <a:spcAft>
+                <a:spcPts val="0"/>
+              </a:spcAft>
+              <a:buSzPts val="1400"/>
+              <a:buNone/>
+              <a:defRPr/>
+            </a:lvl9pPr>
+          </a:lstStyle>
+          <a:p>
+            <a:endParaRPr/>
+          </a:p>
+        </p:txBody>
+      </p:sp>
+      <p:sp>
+        <p:nvSpPr>
+          <p:cNvPr id="80" name="Google Shape;80;p13"/>
+          <p:cNvSpPr txBox="1">
+            <a:spLocks noGrp="1"/>
+          </p:cNvSpPr>
+          <p:nvPr>
+            <p:ph type="body" idx="1"/>
+          </p:nvPr>
+        </p:nvSpPr>
+        <p:spPr>
+          <a:xfrm rot="5400000">
+            <a:off x="3150869" y="12317731"/>
+            <a:ext cx="134820662" cy="122834400"/>
+          </a:xfrm>
+          <a:prstGeom prst="rect">
+            <a:avLst/>
+          </a:prstGeom>
+          <a:noFill/>
+          <a:ln>
+            <a:noFill/>
+          </a:ln>
+        </p:spPr>
+        <p:txBody>
+          <a:bodyPr spcFirstLastPara="1" wrap="square" lIns="349525" tIns="174750" rIns="349525" bIns="174750" anchor="t" anchorCtr="0">
+            <a:noAutofit/>
+          </a:bodyPr>
+          <a:lstStyle>
+            <a:lvl1pPr marL="457200" lvl="0" indent="-342900" algn="l">
+              <a:spcBef>
+                <a:spcPts val="360"/>
+              </a:spcBef>
+              <a:spcAft>
+                <a:spcPts val="0"/>
+              </a:spcAft>
+              <a:buClr>
+                <a:schemeClr val="dk1"/>
+              </a:buClr>
+              <a:buSzPts val="1800"/>
+              <a:buChar char="•"/>
+              <a:defRPr/>
+            </a:lvl1pPr>
+            <a:lvl2pPr marL="914400" lvl="1" indent="-342900" algn="l">
+              <a:spcBef>
+                <a:spcPts val="360"/>
+              </a:spcBef>
+              <a:spcAft>
+                <a:spcPts val="0"/>
+              </a:spcAft>
+              <a:buClr>
+                <a:schemeClr val="dk1"/>
+              </a:buClr>
+              <a:buSzPts val="1800"/>
+              <a:buChar char="–"/>
+              <a:defRPr/>
+            </a:lvl2pPr>
+            <a:lvl3pPr marL="1371600" lvl="2" indent="-342900" algn="l">
+              <a:spcBef>
+                <a:spcPts val="360"/>
+              </a:spcBef>
+              <a:spcAft>
+                <a:spcPts val="0"/>
+              </a:spcAft>
+              <a:buClr>
+                <a:schemeClr val="dk1"/>
+              </a:buClr>
+              <a:buSzPts val="1800"/>
+              <a:buChar char="•"/>
+              <a:defRPr/>
+            </a:lvl3pPr>
+            <a:lvl4pPr marL="1828800" lvl="3" indent="-342900" algn="l">
+              <a:spcBef>
+                <a:spcPts val="360"/>
+              </a:spcBef>
+              <a:spcAft>
+                <a:spcPts val="0"/>
+              </a:spcAft>
+              <a:buClr>
+                <a:schemeClr val="dk1"/>
+              </a:buClr>
+              <a:buSzPts val="1800"/>
+              <a:buChar char="–"/>
+              <a:defRPr/>
+            </a:lvl4pPr>
+            <a:lvl5pPr marL="2286000" lvl="4" indent="-342900" algn="l">
+              <a:spcBef>
+                <a:spcPts val="360"/>
+              </a:spcBef>
+              <a:spcAft>
+                <a:spcPts val="0"/>
+              </a:spcAft>
+              <a:buClr>
+                <a:schemeClr val="dk1"/>
+              </a:buClr>
+              <a:buSzPts val="1800"/>
+              <a:buChar char="»"/>
+              <a:defRPr/>
+            </a:lvl5pPr>
+            <a:lvl6pPr marL="2743200" lvl="5" indent="-342900" algn="l">
+              <a:spcBef>
+                <a:spcPts val="360"/>
+              </a:spcBef>
+              <a:spcAft>
+                <a:spcPts val="0"/>
+              </a:spcAft>
+              <a:buClr>
+                <a:schemeClr val="dk1"/>
+              </a:buClr>
+              <a:buSzPts val="1800"/>
+              <a:buChar char="•"/>
+              <a:defRPr/>
+            </a:lvl6pPr>
+            <a:lvl7pPr marL="3200400" lvl="6" indent="-342900" algn="l">
+              <a:spcBef>
+                <a:spcPts val="360"/>
+              </a:spcBef>
+              <a:spcAft>
+                <a:spcPts val="0"/>
+              </a:spcAft>
+              <a:buClr>
+                <a:schemeClr val="dk1"/>
+              </a:buClr>
+              <a:buSzPts val="1800"/>
+              <a:buChar char="•"/>
+              <a:defRPr/>
+            </a:lvl7pPr>
+            <a:lvl8pPr marL="3657600" lvl="7" indent="-342900" algn="l">
+              <a:spcBef>
+                <a:spcPts val="360"/>
+              </a:spcBef>
+              <a:spcAft>
+                <a:spcPts val="0"/>
+              </a:spcAft>
+              <a:buClr>
+                <a:schemeClr val="dk1"/>
+              </a:buClr>
+              <a:buSzPts val="1800"/>
+              <a:buChar char="•"/>
+              <a:defRPr/>
+            </a:lvl8pPr>
+            <a:lvl9pPr marL="4114800" lvl="8" indent="-342900" algn="l">
+              <a:spcBef>
+                <a:spcPts val="360"/>
+              </a:spcBef>
+              <a:spcAft>
+                <a:spcPts val="0"/>
+              </a:spcAft>
+              <a:buClr>
+                <a:schemeClr val="dk1"/>
+              </a:buClr>
+              <a:buSzPts val="1800"/>
+              <a:buChar char="•"/>
+              <a:defRPr/>
+            </a:lvl9pPr>
+          </a:lstStyle>
+          <a:p>
+            <a:endParaRPr/>
+          </a:p>
+        </p:txBody>
+      </p:sp>
+      <p:sp>
+        <p:nvSpPr>
+          <p:cNvPr id="81" name="Google Shape;81;p13"/>
+          <p:cNvSpPr txBox="1">
+            <a:spLocks noGrp="1"/>
+          </p:cNvSpPr>
+          <p:nvPr>
+            <p:ph type="dt" idx="10"/>
+          </p:nvPr>
+        </p:nvSpPr>
+        <p:spPr>
+          <a:xfrm>
+            <a:off x="1829043" y="30510162"/>
+            <a:ext cx="8533917" cy="1753557"/>
+          </a:xfrm>
+          <a:prstGeom prst="rect">
+            <a:avLst/>
+          </a:prstGeom>
+          <a:noFill/>
+          <a:ln>
+            <a:noFill/>
+          </a:ln>
+        </p:spPr>
+        <p:txBody>
+          <a:bodyPr spcFirstLastPara="1" wrap="square" lIns="349525" tIns="174750" rIns="349525" bIns="174750" anchor="ctr" anchorCtr="0">
+            <a:noAutofit/>
+          </a:bodyPr>
+          <a:lstStyle>
+            <a:lvl1pPr lvl="0" algn="l">
+              <a:spcBef>
+                <a:spcPts val="0"/>
+              </a:spcBef>
+              <a:spcAft>
+                <a:spcPts val="0"/>
+              </a:spcAft>
+              <a:buSzPts val="1400"/>
+              <a:buNone/>
+              <a:defRPr/>
+            </a:lvl1pPr>
+            <a:lvl2pPr lvl="1" algn="l">
+              <a:spcBef>
+                <a:spcPts val="0"/>
+              </a:spcBef>
+              <a:spcAft>
+                <a:spcPts val="0"/>
+              </a:spcAft>
+              <a:buSzPts val="1400"/>
+              <a:buNone/>
+              <a:defRPr/>
+            </a:lvl2pPr>
+            <a:lvl3pPr lvl="2" algn="l">
+              <a:spcBef>
+                <a:spcPts val="0"/>
+              </a:spcBef>
+              <a:spcAft>
+                <a:spcPts val="0"/>
+              </a:spcAft>
+              <a:buSzPts val="1400"/>
+              <a:buNone/>
+              <a:defRPr/>
+            </a:lvl3pPr>
+            <a:lvl4pPr lvl="3" algn="l">
+              <a:spcBef>
+                <a:spcPts val="0"/>
+              </a:spcBef>
+              <a:spcAft>
+                <a:spcPts val="0"/>
+              </a:spcAft>
+              <a:buSzPts val="1400"/>
+              <a:buNone/>
+              <a:defRPr/>
+            </a:lvl4pPr>
+            <a:lvl5pPr lvl="4" algn="l">
+              <a:spcBef>
+                <a:spcPts val="0"/>
+              </a:spcBef>
+              <a:spcAft>
+                <a:spcPts val="0"/>
+              </a:spcAft>
+              <a:buSzPts val="1400"/>
+              <a:buNone/>
+              <a:defRPr/>
+            </a:lvl5pPr>
+            <a:lvl6pPr lvl="5" algn="l">
+              <a:spcBef>
+                <a:spcPts val="0"/>
+              </a:spcBef>
+              <a:spcAft>
+                <a:spcPts val="0"/>
+              </a:spcAft>
+              <a:buSzPts val="1400"/>
+              <a:buNone/>
+              <a:defRPr/>
+            </a:lvl6pPr>
+            <a:lvl7pPr lvl="6" algn="l">
+              <a:spcBef>
+                <a:spcPts val="0"/>
+              </a:spcBef>
+              <a:spcAft>
+                <a:spcPts val="0"/>
+              </a:spcAft>
+              <a:buSzPts val="1400"/>
+              <a:buNone/>
+              <a:defRPr/>
+            </a:lvl7pPr>
+            <a:lvl8pPr lvl="7" algn="l">
+              <a:spcBef>
+                <a:spcPts val="0"/>
+              </a:spcBef>
+              <a:spcAft>
+                <a:spcPts val="0"/>
+              </a:spcAft>
+              <a:buSzPts val="1400"/>
+              <a:buNone/>
+              <a:defRPr/>
+            </a:lvl8pPr>
+            <a:lvl9pPr lvl="8" algn="l">
+              <a:spcBef>
+                <a:spcPts val="0"/>
+              </a:spcBef>
+              <a:spcAft>
+                <a:spcPts val="0"/>
+              </a:spcAft>
+              <a:buSzPts val="1400"/>
+              <a:buNone/>
+              <a:defRPr/>
+            </a:lvl9pPr>
+          </a:lstStyle>
+          <a:p>
+            <a:endParaRPr/>
+          </a:p>
+        </p:txBody>
+      </p:sp>
+      <p:sp>
+        <p:nvSpPr>
+          <p:cNvPr id="82" name="Google Shape;82;p13"/>
+          <p:cNvSpPr txBox="1">
+            <a:spLocks noGrp="1"/>
+          </p:cNvSpPr>
+          <p:nvPr>
+            <p:ph type="ftr" idx="11"/>
+          </p:nvPr>
+        </p:nvSpPr>
+        <p:spPr>
+          <a:xfrm>
+            <a:off x="12496840" y="30510162"/>
+            <a:ext cx="11582320" cy="1753557"/>
+          </a:xfrm>
+          <a:prstGeom prst="rect">
+            <a:avLst/>
+          </a:prstGeom>
+          <a:noFill/>
+          <a:ln>
+            <a:noFill/>
+          </a:ln>
+        </p:spPr>
+        <p:txBody>
+          <a:bodyPr spcFirstLastPara="1" wrap="square" lIns="349525" tIns="174750" rIns="349525" bIns="174750" anchor="ctr" anchorCtr="0">
+            <a:noAutofit/>
+          </a:bodyPr>
+          <a:lstStyle>
+            <a:lvl1pPr lvl="0" algn="ctr">
+              <a:spcBef>
+                <a:spcPts val="0"/>
+              </a:spcBef>
+              <a:spcAft>
+                <a:spcPts val="0"/>
+              </a:spcAft>
+              <a:buSzPts val="1400"/>
+              <a:buNone/>
+              <a:defRPr/>
+            </a:lvl1pPr>
+            <a:lvl2pPr lvl="1" algn="l">
+              <a:spcBef>
+                <a:spcPts val="0"/>
+              </a:spcBef>
+              <a:spcAft>
+                <a:spcPts val="0"/>
+              </a:spcAft>
+              <a:buSzPts val="1400"/>
+              <a:buNone/>
+              <a:defRPr/>
+            </a:lvl2pPr>
+            <a:lvl3pPr lvl="2" algn="l">
+              <a:spcBef>
+                <a:spcPts val="0"/>
+              </a:spcBef>
+              <a:spcAft>
+                <a:spcPts val="0"/>
+              </a:spcAft>
+              <a:buSzPts val="1400"/>
+              <a:buNone/>
+              <a:defRPr/>
+            </a:lvl3pPr>
+            <a:lvl4pPr lvl="3" algn="l">
+              <a:spcBef>
+                <a:spcPts val="0"/>
+              </a:spcBef>
+              <a:spcAft>
+                <a:spcPts val="0"/>
+              </a:spcAft>
+              <a:buSzPts val="1400"/>
+              <a:buNone/>
+              <a:defRPr/>
+            </a:lvl4pPr>
+            <a:lvl5pPr lvl="4" algn="l">
+              <a:spcBef>
+                <a:spcPts val="0"/>
+              </a:spcBef>
+              <a:spcAft>
+                <a:spcPts val="0"/>
+              </a:spcAft>
+              <a:buSzPts val="1400"/>
+              <a:buNone/>
+              <a:defRPr/>
+            </a:lvl5pPr>
+            <a:lvl6pPr lvl="5" algn="l">
+              <a:spcBef>
+                <a:spcPts val="0"/>
+              </a:spcBef>
+              <a:spcAft>
+                <a:spcPts val="0"/>
+              </a:spcAft>
+              <a:buSzPts val="1400"/>
+              <a:buNone/>
+              <a:defRPr/>
+            </a:lvl6pPr>
+            <a:lvl7pPr lvl="6" algn="l">
+              <a:spcBef>
+                <a:spcPts val="0"/>
+              </a:spcBef>
+              <a:spcAft>
+                <a:spcPts val="0"/>
+              </a:spcAft>
+              <a:buSzPts val="1400"/>
+              <a:buNone/>
+              <a:defRPr/>
+            </a:lvl7pPr>
+            <a:lvl8pPr lvl="7" algn="l">
+              <a:spcBef>
+                <a:spcPts val="0"/>
+              </a:spcBef>
+              <a:spcAft>
+                <a:spcPts val="0"/>
+              </a:spcAft>
+              <a:buSzPts val="1400"/>
+              <a:buNone/>
+              <a:defRPr/>
+            </a:lvl8pPr>
+            <a:lvl9pPr lvl="8" algn="l">
+              <a:spcBef>
+                <a:spcPts val="0"/>
+              </a:spcBef>
+              <a:spcAft>
+                <a:spcPts val="0"/>
+              </a:spcAft>
+              <a:buSzPts val="1400"/>
+              <a:buNone/>
+              <a:defRPr/>
+            </a:lvl9pPr>
+          </a:lstStyle>
+          <a:p>
+            <a:endParaRPr/>
+          </a:p>
+        </p:txBody>
+      </p:sp>
+      <p:sp>
+        <p:nvSpPr>
+          <p:cNvPr id="83" name="Google Shape;83;p13"/>
           <p:cNvSpPr txBox="1">
             <a:spLocks noGrp="1"/>
           </p:cNvSpPr>
@@ -11279,15 +10695,14 @@
   <p:clrMap bg1="lt1" tx1="dk1" bg2="dk2" tx2="lt2" accent1="accent1" accent2="accent2" accent3="accent3" accent4="accent4" accent5="accent5" accent6="accent6" hlink="hlink" folHlink="folHlink"/>
   <p:sldLayoutIdLst>
     <p:sldLayoutId id="2147483649" r:id="rId1"/>
-    <p:sldLayoutId id="2147483651" r:id="rId2"/>
-    <p:sldLayoutId id="2147483652" r:id="rId3"/>
-    <p:sldLayoutId id="2147483653" r:id="rId4"/>
-    <p:sldLayoutId id="2147483654" r:id="rId5"/>
-    <p:sldLayoutId id="2147483655" r:id="rId6"/>
-    <p:sldLayoutId id="2147483656" r:id="rId7"/>
-    <p:sldLayoutId id="2147483657" r:id="rId8"/>
-    <p:sldLayoutId id="2147483658" r:id="rId9"/>
-    <p:sldLayoutId id="2147483659" r:id="rId10"/>
+    <p:sldLayoutId id="2147483652" r:id="rId2"/>
+    <p:sldLayoutId id="2147483653" r:id="rId3"/>
+    <p:sldLayoutId id="2147483654" r:id="rId4"/>
+    <p:sldLayoutId id="2147483655" r:id="rId5"/>
+    <p:sldLayoutId id="2147483656" r:id="rId6"/>
+    <p:sldLayoutId id="2147483657" r:id="rId7"/>
+    <p:sldLayoutId id="2147483658" r:id="rId8"/>
+    <p:sldLayoutId id="2147483659" r:id="rId9"/>
   </p:sldLayoutIdLst>
   <p:hf sldNum="0" hdr="0" ftr="0" dt="0"/>
   <p:txStyles>
@@ -12007,12 +11422,58 @@
           <a:chExt cx="0" cy="0"/>
         </a:xfrm>
       </p:grpSpPr>
+      <p:sp>
+        <p:nvSpPr>
+          <p:cNvPr id="17" name="Rectangle 16">
+            <a:extLst>
+              <a:ext uri="{FF2B5EF4-FFF2-40B4-BE49-F238E27FC236}">
+                <a16:creationId xmlns:a16="http://schemas.microsoft.com/office/drawing/2014/main" id="{C5620718-9FB8-71F8-882A-F888C5B63882}"/>
+              </a:ext>
+            </a:extLst>
+          </p:cNvPr>
+          <p:cNvSpPr/>
+          <p:nvPr/>
+        </p:nvSpPr>
+        <p:spPr>
+          <a:xfrm>
+            <a:off x="4395268" y="5932030"/>
+            <a:ext cx="2825496" cy="32427996"/>
+          </a:xfrm>
+          <a:prstGeom prst="rect">
+            <a:avLst/>
+          </a:prstGeom>
+        </p:spPr>
+        <p:style>
+          <a:lnRef idx="2">
+            <a:schemeClr val="accent1">
+              <a:shade val="15000"/>
+            </a:schemeClr>
+          </a:lnRef>
+          <a:fillRef idx="1">
+            <a:schemeClr val="accent1"/>
+          </a:fillRef>
+          <a:effectRef idx="0">
+            <a:schemeClr val="accent1"/>
+          </a:effectRef>
+          <a:fontRef idx="minor">
+            <a:schemeClr val="lt1"/>
+          </a:fontRef>
+        </p:style>
+        <p:txBody>
+          <a:bodyPr rtlCol="0" anchor="ctr"/>
+          <a:lstStyle/>
+          <a:p>
+            <a:pPr algn="ctr"/>
+            <a:endParaRPr lang="en-US" dirty="0"/>
+          </a:p>
+        </p:txBody>
+      </p:sp>
       <p:pic>
         <p:nvPicPr>
-          <p:cNvPr id="185" name="Graphic 184" descr="Checkmark with solid fill">
+          <p:cNvPr id="10" name="Graphic 9">
             <a:extLst>
               <a:ext uri="{FF2B5EF4-FFF2-40B4-BE49-F238E27FC236}">
-                <a16:creationId xmlns:a16="http://schemas.microsoft.com/office/drawing/2014/main" id="{DCA27A5C-FBBE-5048-B662-459BE66B6EC3}"/>
+                <a16:creationId xmlns:a16="http://schemas.microsoft.com/office/drawing/2014/main" id="{AA76152B-2256-C8AA-28BF-6882CAC42ADC}"/>
               </a:ext>
             </a:extLst>
           </p:cNvPr>
@@ -12029,14 +11490,15 @@
               </a:ext>
             </a:extLst>
           </a:blip>
+          <a:srcRect t="14583" r="5341" b="14016"/>
           <a:stretch>
             <a:fillRect/>
           </a:stretch>
         </p:blipFill>
         <p:spPr>
           <a:xfrm>
-            <a:off x="1494535" y="11314090"/>
-            <a:ext cx="1480101" cy="1507512"/>
+            <a:off x="4653738" y="8083778"/>
+            <a:ext cx="31922262" cy="21118019"/>
           </a:xfrm>
           <a:prstGeom prst="rect">
             <a:avLst/>
@@ -12045,10 +11507,10 @@
       </p:pic>
       <p:pic>
         <p:nvPicPr>
-          <p:cNvPr id="188" name="Graphic 187" descr="Close with solid fill">
+          <p:cNvPr id="185" name="Graphic 184" descr="Checkmark with solid fill">
             <a:extLst>
               <a:ext uri="{FF2B5EF4-FFF2-40B4-BE49-F238E27FC236}">
-                <a16:creationId xmlns:a16="http://schemas.microsoft.com/office/drawing/2014/main" id="{779FDD90-9EAF-BCDA-F31C-068DD154F1C2}"/>
+                <a16:creationId xmlns:a16="http://schemas.microsoft.com/office/drawing/2014/main" id="{DCA27A5C-FBBE-5048-B662-459BE66B6EC3}"/>
               </a:ext>
             </a:extLst>
           </p:cNvPr>
@@ -12071,8 +11533,8 @@
         </p:blipFill>
         <p:spPr>
           <a:xfrm>
-            <a:off x="1497119" y="9012553"/>
-            <a:ext cx="1480101" cy="1507512"/>
+            <a:off x="3280021" y="11293952"/>
+            <a:ext cx="1110401" cy="1130965"/>
           </a:xfrm>
           <a:prstGeom prst="rect">
             <a:avLst/>
@@ -12081,118 +11543,10 @@
       </p:pic>
       <p:pic>
         <p:nvPicPr>
-          <p:cNvPr id="191" name="Graphic 190" descr="Checkmark with solid fill">
+          <p:cNvPr id="188" name="Graphic 187" descr="Close with solid fill">
             <a:extLst>
               <a:ext uri="{FF2B5EF4-FFF2-40B4-BE49-F238E27FC236}">
-                <a16:creationId xmlns:a16="http://schemas.microsoft.com/office/drawing/2014/main" id="{45B2AA1C-2005-7495-C00B-187ADC42C46F}"/>
-              </a:ext>
-            </a:extLst>
-          </p:cNvPr>
-          <p:cNvPicPr>
-            <a:picLocks noChangeAspect="1"/>
-          </p:cNvPicPr>
-          <p:nvPr/>
-        </p:nvPicPr>
-        <p:blipFill>
-          <a:blip r:embed="rId3">
-            <a:extLst>
-              <a:ext uri="{96DAC541-7B7A-43D3-8B79-37D633B846F1}">
-                <asvg:svgBlip xmlns:asvg="http://schemas.microsoft.com/office/drawing/2016/SVG/main" r:embed="rId4"/>
-              </a:ext>
-            </a:extLst>
-          </a:blip>
-          <a:stretch>
-            <a:fillRect/>
-          </a:stretch>
-        </p:blipFill>
-        <p:spPr>
-          <a:xfrm>
-            <a:off x="1496124" y="20491322"/>
-            <a:ext cx="1480101" cy="1507512"/>
-          </a:xfrm>
-          <a:prstGeom prst="rect">
-            <a:avLst/>
-          </a:prstGeom>
-        </p:spPr>
-      </p:pic>
-      <p:pic>
-        <p:nvPicPr>
-          <p:cNvPr id="198" name="Graphic 197" descr="Checkmark with solid fill">
-            <a:extLst>
-              <a:ext uri="{FF2B5EF4-FFF2-40B4-BE49-F238E27FC236}">
-                <a16:creationId xmlns:a16="http://schemas.microsoft.com/office/drawing/2014/main" id="{36980361-4218-5E26-8269-F3A9CB31A788}"/>
-              </a:ext>
-            </a:extLst>
-          </p:cNvPr>
-          <p:cNvPicPr>
-            <a:picLocks noChangeAspect="1"/>
-          </p:cNvPicPr>
-          <p:nvPr/>
-        </p:nvPicPr>
-        <p:blipFill>
-          <a:blip r:embed="rId3">
-            <a:extLst>
-              <a:ext uri="{96DAC541-7B7A-43D3-8B79-37D633B846F1}">
-                <asvg:svgBlip xmlns:asvg="http://schemas.microsoft.com/office/drawing/2016/SVG/main" r:embed="rId4"/>
-              </a:ext>
-            </a:extLst>
-          </a:blip>
-          <a:stretch>
-            <a:fillRect/>
-          </a:stretch>
-        </p:blipFill>
-        <p:spPr>
-          <a:xfrm>
-            <a:off x="1496123" y="25083427"/>
-            <a:ext cx="1480101" cy="1507512"/>
-          </a:xfrm>
-          <a:prstGeom prst="rect">
-            <a:avLst/>
-          </a:prstGeom>
-        </p:spPr>
-      </p:pic>
-      <p:pic>
-        <p:nvPicPr>
-          <p:cNvPr id="199" name="Graphic 198" descr="Checkmark with solid fill">
-            <a:extLst>
-              <a:ext uri="{FF2B5EF4-FFF2-40B4-BE49-F238E27FC236}">
-                <a16:creationId xmlns:a16="http://schemas.microsoft.com/office/drawing/2014/main" id="{58C350FE-7A57-656E-8C30-D3586FB310A7}"/>
-              </a:ext>
-            </a:extLst>
-          </p:cNvPr>
-          <p:cNvPicPr>
-            <a:picLocks noChangeAspect="1"/>
-          </p:cNvPicPr>
-          <p:nvPr/>
-        </p:nvPicPr>
-        <p:blipFill>
-          <a:blip r:embed="rId3">
-            <a:extLst>
-              <a:ext uri="{96DAC541-7B7A-43D3-8B79-37D633B846F1}">
-                <asvg:svgBlip xmlns:asvg="http://schemas.microsoft.com/office/drawing/2016/SVG/main" r:embed="rId4"/>
-              </a:ext>
-            </a:extLst>
-          </a:blip>
-          <a:stretch>
-            <a:fillRect/>
-          </a:stretch>
-        </p:blipFill>
-        <p:spPr>
-          <a:xfrm>
-            <a:off x="1494535" y="15901912"/>
-            <a:ext cx="1480101" cy="1507512"/>
-          </a:xfrm>
-          <a:prstGeom prst="rect">
-            <a:avLst/>
-          </a:prstGeom>
-        </p:spPr>
-      </p:pic>
-      <p:pic>
-        <p:nvPicPr>
-          <p:cNvPr id="3" name="Graphic 2">
-            <a:extLst>
-              <a:ext uri="{FF2B5EF4-FFF2-40B4-BE49-F238E27FC236}">
-                <a16:creationId xmlns:a16="http://schemas.microsoft.com/office/drawing/2014/main" id="{47E1DC43-5DA3-C19F-30EB-DD4237D24563}"/>
+                <a16:creationId xmlns:a16="http://schemas.microsoft.com/office/drawing/2014/main" id="{779FDD90-9EAF-BCDA-F31C-068DD154F1C2}"/>
               </a:ext>
             </a:extLst>
           </p:cNvPr>
@@ -12215,8 +11569,116 @@
         </p:blipFill>
         <p:spPr>
           <a:xfrm>
-            <a:off x="3197626" y="4936512"/>
-            <a:ext cx="38696636" cy="28069259"/>
+            <a:off x="3282541" y="9618445"/>
+            <a:ext cx="1110401" cy="1130965"/>
+          </a:xfrm>
+          <a:prstGeom prst="rect">
+            <a:avLst/>
+          </a:prstGeom>
+        </p:spPr>
+      </p:pic>
+      <p:pic>
+        <p:nvPicPr>
+          <p:cNvPr id="191" name="Graphic 190" descr="Checkmark with solid fill">
+            <a:extLst>
+              <a:ext uri="{FF2B5EF4-FFF2-40B4-BE49-F238E27FC236}">
+                <a16:creationId xmlns:a16="http://schemas.microsoft.com/office/drawing/2014/main" id="{45B2AA1C-2005-7495-C00B-187ADC42C46F}"/>
+              </a:ext>
+            </a:extLst>
+          </p:cNvPr>
+          <p:cNvPicPr>
+            <a:picLocks noChangeAspect="1"/>
+          </p:cNvPicPr>
+          <p:nvPr/>
+        </p:nvPicPr>
+        <p:blipFill>
+          <a:blip r:embed="rId5">
+            <a:extLst>
+              <a:ext uri="{96DAC541-7B7A-43D3-8B79-37D633B846F1}">
+                <asvg:svgBlip xmlns:asvg="http://schemas.microsoft.com/office/drawing/2016/SVG/main" r:embed="rId6"/>
+              </a:ext>
+            </a:extLst>
+          </a:blip>
+          <a:stretch>
+            <a:fillRect/>
+          </a:stretch>
+        </p:blipFill>
+        <p:spPr>
+          <a:xfrm>
+            <a:off x="3281691" y="17972681"/>
+            <a:ext cx="1110401" cy="1130965"/>
+          </a:xfrm>
+          <a:prstGeom prst="rect">
+            <a:avLst/>
+          </a:prstGeom>
+        </p:spPr>
+      </p:pic>
+      <p:pic>
+        <p:nvPicPr>
+          <p:cNvPr id="198" name="Graphic 197" descr="Checkmark with solid fill">
+            <a:extLst>
+              <a:ext uri="{FF2B5EF4-FFF2-40B4-BE49-F238E27FC236}">
+                <a16:creationId xmlns:a16="http://schemas.microsoft.com/office/drawing/2014/main" id="{36980361-4218-5E26-8269-F3A9CB31A788}"/>
+              </a:ext>
+            </a:extLst>
+          </p:cNvPr>
+          <p:cNvPicPr>
+            <a:picLocks noChangeAspect="1"/>
+          </p:cNvPicPr>
+          <p:nvPr/>
+        </p:nvPicPr>
+        <p:blipFill>
+          <a:blip r:embed="rId5">
+            <a:extLst>
+              <a:ext uri="{96DAC541-7B7A-43D3-8B79-37D633B846F1}">
+                <asvg:svgBlip xmlns:asvg="http://schemas.microsoft.com/office/drawing/2016/SVG/main" r:embed="rId6"/>
+              </a:ext>
+            </a:extLst>
+          </a:blip>
+          <a:stretch>
+            <a:fillRect/>
+          </a:stretch>
+        </p:blipFill>
+        <p:spPr>
+          <a:xfrm>
+            <a:off x="3280021" y="21314968"/>
+            <a:ext cx="1110401" cy="1130965"/>
+          </a:xfrm>
+          <a:prstGeom prst="rect">
+            <a:avLst/>
+          </a:prstGeom>
+        </p:spPr>
+      </p:pic>
+      <p:pic>
+        <p:nvPicPr>
+          <p:cNvPr id="199" name="Graphic 198" descr="Checkmark with solid fill">
+            <a:extLst>
+              <a:ext uri="{FF2B5EF4-FFF2-40B4-BE49-F238E27FC236}">
+                <a16:creationId xmlns:a16="http://schemas.microsoft.com/office/drawing/2014/main" id="{58C350FE-7A57-656E-8C30-D3586FB310A7}"/>
+              </a:ext>
+            </a:extLst>
+          </p:cNvPr>
+          <p:cNvPicPr>
+            <a:picLocks noChangeAspect="1"/>
+          </p:cNvPicPr>
+          <p:nvPr/>
+        </p:nvPicPr>
+        <p:blipFill>
+          <a:blip r:embed="rId5">
+            <a:extLst>
+              <a:ext uri="{96DAC541-7B7A-43D3-8B79-37D633B846F1}">
+                <asvg:svgBlip xmlns:asvg="http://schemas.microsoft.com/office/drawing/2016/SVG/main" r:embed="rId6"/>
+              </a:ext>
+            </a:extLst>
+          </a:blip>
+          <a:stretch>
+            <a:fillRect/>
+          </a:stretch>
+        </p:blipFill>
+        <p:spPr>
+          <a:xfrm>
+            <a:off x="3280182" y="14629503"/>
+            <a:ext cx="1110401" cy="1130965"/>
           </a:xfrm>
           <a:prstGeom prst="rect">
             <a:avLst/>
@@ -12237,7 +11699,7 @@
         </p:nvSpPr>
         <p:spPr>
           <a:xfrm>
-            <a:off x="-11297285" y="9744938"/>
+            <a:off x="-11297285" y="10162099"/>
             <a:ext cx="61264800" cy="45719"/>
           </a:xfrm>
           <a:prstGeom prst="rect">
@@ -12283,7 +11745,7 @@
         </p:nvSpPr>
         <p:spPr>
           <a:xfrm>
-            <a:off x="-11144885" y="12043638"/>
+            <a:off x="-11297285" y="11837181"/>
             <a:ext cx="61264800" cy="45719"/>
           </a:xfrm>
           <a:prstGeom prst="rect">
@@ -12329,7 +11791,7 @@
         </p:nvSpPr>
         <p:spPr>
           <a:xfrm>
-            <a:off x="-10992485" y="16632846"/>
+            <a:off x="-11297285" y="15173133"/>
             <a:ext cx="61264800" cy="45719"/>
           </a:xfrm>
           <a:prstGeom prst="rect">
@@ -12375,7 +11837,7 @@
         </p:nvSpPr>
         <p:spPr>
           <a:xfrm>
-            <a:off x="-10840085" y="21222646"/>
+            <a:off x="-11297285" y="18514672"/>
             <a:ext cx="61264800" cy="45719"/>
           </a:xfrm>
           <a:prstGeom prst="rect">
@@ -12421,7 +11883,7 @@
         </p:nvSpPr>
         <p:spPr>
           <a:xfrm>
-            <a:off x="-10641965" y="25814324"/>
+            <a:off x="-10017531" y="21857256"/>
             <a:ext cx="61264800" cy="45719"/>
           </a:xfrm>
           <a:prstGeom prst="rect">
@@ -12455,10 +11917,10 @@
       </p:sp>
       <p:sp>
         <p:nvSpPr>
-          <p:cNvPr id="17" name="Rectangle 16">
+          <p:cNvPr id="13" name="Rectangle 12">
             <a:extLst>
               <a:ext uri="{FF2B5EF4-FFF2-40B4-BE49-F238E27FC236}">
-                <a16:creationId xmlns:a16="http://schemas.microsoft.com/office/drawing/2014/main" id="{C5620718-9FB8-71F8-882A-F888C5B63882}"/>
+                <a16:creationId xmlns:a16="http://schemas.microsoft.com/office/drawing/2014/main" id="{0467AC0E-E8F4-1776-3E12-78FB802679E2}"/>
               </a:ext>
             </a:extLst>
           </p:cNvPr>
@@ -12467,8 +11929,8 @@
         </p:nvSpPr>
         <p:spPr>
           <a:xfrm>
-            <a:off x="3001295" y="6360047"/>
-            <a:ext cx="2825496" cy="32427996"/>
+            <a:off x="-10108971" y="23527041"/>
+            <a:ext cx="61264800" cy="45719"/>
           </a:xfrm>
           <a:prstGeom prst="rect">
             <a:avLst/>
@@ -12499,6 +11961,42 @@
           </a:p>
         </p:txBody>
       </p:sp>
+      <p:pic>
+        <p:nvPicPr>
+          <p:cNvPr id="18" name="Graphic 17" descr="Close with solid fill">
+            <a:extLst>
+              <a:ext uri="{FF2B5EF4-FFF2-40B4-BE49-F238E27FC236}">
+                <a16:creationId xmlns:a16="http://schemas.microsoft.com/office/drawing/2014/main" id="{0715DA1E-4E04-32FD-4A64-CF5BD427F0FF}"/>
+              </a:ext>
+            </a:extLst>
+          </p:cNvPr>
+          <p:cNvPicPr>
+            <a:picLocks noChangeAspect="1"/>
+          </p:cNvPicPr>
+          <p:nvPr/>
+        </p:nvPicPr>
+        <p:blipFill>
+          <a:blip r:embed="rId7">
+            <a:extLst>
+              <a:ext uri="{96DAC541-7B7A-43D3-8B79-37D633B846F1}">
+                <asvg:svgBlip xmlns:asvg="http://schemas.microsoft.com/office/drawing/2016/SVG/main" r:embed="rId8"/>
+              </a:ext>
+            </a:extLst>
+          </a:blip>
+          <a:stretch>
+            <a:fillRect/>
+          </a:stretch>
+        </p:blipFill>
+        <p:spPr>
+          <a:xfrm>
+            <a:off x="3281485" y="22985400"/>
+            <a:ext cx="1110401" cy="1130965"/>
+          </a:xfrm>
+          <a:prstGeom prst="rect">
+            <a:avLst/>
+          </a:prstGeom>
+        </p:spPr>
+      </p:pic>
     </p:spTree>
   </p:cSld>
   <p:clrMapOvr>
@@ -12523,7 +12021,7 @@
         <p:cNvPr id="1" name="Shape 88">
           <a:extLst>
             <a:ext uri="{FF2B5EF4-FFF2-40B4-BE49-F238E27FC236}">
-              <a16:creationId xmlns:a16="http://schemas.microsoft.com/office/drawing/2014/main" id="{2001B2A7-E2F5-6F7A-A743-8D4017D1BAE1}"/>
+              <a16:creationId xmlns:a16="http://schemas.microsoft.com/office/drawing/2014/main" id="{5F2E8BC1-8552-BEAE-CE77-DA9852718BE1}"/>
             </a:ext>
           </a:extLst>
         </p:cNvPr>
@@ -12538,248 +12036,263 @@
           <a:chExt cx="0" cy="0"/>
         </a:xfrm>
       </p:grpSpPr>
-      <p:grpSp>
-        <p:nvGrpSpPr>
-          <p:cNvPr id="2" name="Group 1">
+      <p:pic>
+        <p:nvPicPr>
+          <p:cNvPr id="10" name="Graphic 9">
             <a:extLst>
               <a:ext uri="{FF2B5EF4-FFF2-40B4-BE49-F238E27FC236}">
-                <a16:creationId xmlns:a16="http://schemas.microsoft.com/office/drawing/2014/main" id="{9121A2DA-5A77-BEB9-01BE-4A6CF0143DF3}"/>
+                <a16:creationId xmlns:a16="http://schemas.microsoft.com/office/drawing/2014/main" id="{D3CB0810-F947-2646-9468-72BF6F499728}"/>
               </a:ext>
             </a:extLst>
           </p:cNvPr>
-          <p:cNvGrpSpPr/>
+          <p:cNvPicPr>
+            <a:picLocks noChangeAspect="1"/>
+          </p:cNvPicPr>
           <p:nvPr/>
-        </p:nvGrpSpPr>
-        <p:grpSpPr>
+        </p:nvPicPr>
+        <p:blipFill>
+          <a:blip r:embed="rId3">
+            <a:extLst>
+              <a:ext uri="{96DAC541-7B7A-43D3-8B79-37D633B846F1}">
+                <asvg:svgBlip xmlns:asvg="http://schemas.microsoft.com/office/drawing/2016/SVG/main" r:embed="rId4"/>
+              </a:ext>
+            </a:extLst>
+          </a:blip>
+          <a:srcRect t="14583" r="5341" b="14016"/>
+          <a:stretch>
+            <a:fillRect/>
+          </a:stretch>
+        </p:blipFill>
+        <p:spPr>
           <a:xfrm>
-            <a:off x="688110" y="7903029"/>
-            <a:ext cx="35197415" cy="25690571"/>
-            <a:chOff x="1537196" y="4936512"/>
-            <a:chExt cx="38456341" cy="28069259"/>
+            <a:off x="3086196" y="9520692"/>
+            <a:ext cx="31922262" cy="21118019"/>
           </a:xfrm>
-        </p:grpSpPr>
-        <p:pic>
-          <p:nvPicPr>
-            <p:cNvPr id="185" name="Graphic 184" descr="Checkmark with solid fill">
-              <a:extLst>
-                <a:ext uri="{FF2B5EF4-FFF2-40B4-BE49-F238E27FC236}">
-                  <a16:creationId xmlns:a16="http://schemas.microsoft.com/office/drawing/2014/main" id="{5874451E-61CD-4822-7FFF-A23594B8D1BE}"/>
-                </a:ext>
-              </a:extLst>
-            </p:cNvPr>
-            <p:cNvPicPr>
-              <a:picLocks noChangeAspect="1"/>
-            </p:cNvPicPr>
-            <p:nvPr/>
-          </p:nvPicPr>
-          <p:blipFill>
-            <a:blip r:embed="rId3">
-              <a:extLst>
-                <a:ext uri="{96DAC541-7B7A-43D3-8B79-37D633B846F1}">
-                  <asvg:svgBlip xmlns:asvg="http://schemas.microsoft.com/office/drawing/2016/SVG/main" r:embed="rId4"/>
-                </a:ext>
-              </a:extLst>
-            </a:blip>
-            <a:stretch>
-              <a:fillRect/>
-            </a:stretch>
-          </p:blipFill>
-          <p:spPr>
-            <a:xfrm>
-              <a:off x="1537196" y="11357541"/>
-              <a:ext cx="1394780" cy="1420610"/>
-            </a:xfrm>
-            <a:prstGeom prst="rect">
-              <a:avLst/>
-            </a:prstGeom>
-          </p:spPr>
-        </p:pic>
-        <p:pic>
-          <p:nvPicPr>
-            <p:cNvPr id="188" name="Graphic 187" descr="Close with solid fill">
-              <a:extLst>
-                <a:ext uri="{FF2B5EF4-FFF2-40B4-BE49-F238E27FC236}">
-                  <a16:creationId xmlns:a16="http://schemas.microsoft.com/office/drawing/2014/main" id="{F38B9E66-69B9-124F-CC1E-9A44F23A5B94}"/>
-                </a:ext>
-              </a:extLst>
-            </p:cNvPr>
-            <p:cNvPicPr>
-              <a:picLocks noChangeAspect="1"/>
-            </p:cNvPicPr>
-            <p:nvPr/>
-          </p:nvPicPr>
-          <p:blipFill>
-            <a:blip r:embed="rId5">
-              <a:extLst>
-                <a:ext uri="{96DAC541-7B7A-43D3-8B79-37D633B846F1}">
-                  <asvg:svgBlip xmlns:asvg="http://schemas.microsoft.com/office/drawing/2016/SVG/main" r:embed="rId6"/>
-                </a:ext>
-              </a:extLst>
-            </a:blip>
-            <a:stretch>
-              <a:fillRect/>
-            </a:stretch>
-          </p:blipFill>
-          <p:spPr>
-            <a:xfrm>
-              <a:off x="1539780" y="9056004"/>
-              <a:ext cx="1394780" cy="1420610"/>
-            </a:xfrm>
-            <a:prstGeom prst="rect">
-              <a:avLst/>
-            </a:prstGeom>
-          </p:spPr>
-        </p:pic>
-        <p:pic>
-          <p:nvPicPr>
-            <p:cNvPr id="191" name="Graphic 190" descr="Checkmark with solid fill">
-              <a:extLst>
-                <a:ext uri="{FF2B5EF4-FFF2-40B4-BE49-F238E27FC236}">
-                  <a16:creationId xmlns:a16="http://schemas.microsoft.com/office/drawing/2014/main" id="{B7B86BC9-A459-7F7E-F26F-C739D08B72CB}"/>
-                </a:ext>
-              </a:extLst>
-            </p:cNvPr>
-            <p:cNvPicPr>
-              <a:picLocks noChangeAspect="1"/>
-            </p:cNvPicPr>
-            <p:nvPr/>
-          </p:nvPicPr>
-          <p:blipFill>
-            <a:blip r:embed="rId3">
-              <a:extLst>
-                <a:ext uri="{96DAC541-7B7A-43D3-8B79-37D633B846F1}">
-                  <asvg:svgBlip xmlns:asvg="http://schemas.microsoft.com/office/drawing/2016/SVG/main" r:embed="rId4"/>
-                </a:ext>
-              </a:extLst>
-            </a:blip>
-            <a:stretch>
-              <a:fillRect/>
-            </a:stretch>
-          </p:blipFill>
-          <p:spPr>
-            <a:xfrm>
-              <a:off x="1538785" y="20534773"/>
-              <a:ext cx="1394780" cy="1420610"/>
-            </a:xfrm>
-            <a:prstGeom prst="rect">
-              <a:avLst/>
-            </a:prstGeom>
-          </p:spPr>
-        </p:pic>
-        <p:pic>
-          <p:nvPicPr>
-            <p:cNvPr id="198" name="Graphic 197" descr="Checkmark with solid fill">
-              <a:extLst>
-                <a:ext uri="{FF2B5EF4-FFF2-40B4-BE49-F238E27FC236}">
-                  <a16:creationId xmlns:a16="http://schemas.microsoft.com/office/drawing/2014/main" id="{E146FDD4-EDD0-1DA7-52BF-AE4A793C6B6D}"/>
-                </a:ext>
-              </a:extLst>
-            </p:cNvPr>
-            <p:cNvPicPr>
-              <a:picLocks noChangeAspect="1"/>
-            </p:cNvPicPr>
-            <p:nvPr/>
-          </p:nvPicPr>
-          <p:blipFill>
-            <a:blip r:embed="rId3">
-              <a:extLst>
-                <a:ext uri="{96DAC541-7B7A-43D3-8B79-37D633B846F1}">
-                  <asvg:svgBlip xmlns:asvg="http://schemas.microsoft.com/office/drawing/2016/SVG/main" r:embed="rId4"/>
-                </a:ext>
-              </a:extLst>
-            </a:blip>
-            <a:stretch>
-              <a:fillRect/>
-            </a:stretch>
-          </p:blipFill>
-          <p:spPr>
-            <a:xfrm>
-              <a:off x="1538784" y="25126878"/>
-              <a:ext cx="1394780" cy="1420610"/>
-            </a:xfrm>
-            <a:prstGeom prst="rect">
-              <a:avLst/>
-            </a:prstGeom>
-          </p:spPr>
-        </p:pic>
-        <p:pic>
-          <p:nvPicPr>
-            <p:cNvPr id="199" name="Graphic 198" descr="Checkmark with solid fill">
-              <a:extLst>
-                <a:ext uri="{FF2B5EF4-FFF2-40B4-BE49-F238E27FC236}">
-                  <a16:creationId xmlns:a16="http://schemas.microsoft.com/office/drawing/2014/main" id="{D2295816-0CB7-DE5E-F362-07ED0A6CCF94}"/>
-                </a:ext>
-              </a:extLst>
-            </p:cNvPr>
-            <p:cNvPicPr>
-              <a:picLocks noChangeAspect="1"/>
-            </p:cNvPicPr>
-            <p:nvPr/>
-          </p:nvPicPr>
-          <p:blipFill>
-            <a:blip r:embed="rId3">
-              <a:extLst>
-                <a:ext uri="{96DAC541-7B7A-43D3-8B79-37D633B846F1}">
-                  <asvg:svgBlip xmlns:asvg="http://schemas.microsoft.com/office/drawing/2016/SVG/main" r:embed="rId4"/>
-                </a:ext>
-              </a:extLst>
-            </a:blip>
-            <a:stretch>
-              <a:fillRect/>
-            </a:stretch>
-          </p:blipFill>
-          <p:spPr>
-            <a:xfrm>
-              <a:off x="1537196" y="15945363"/>
-              <a:ext cx="1394780" cy="1420610"/>
-            </a:xfrm>
-            <a:prstGeom prst="rect">
-              <a:avLst/>
-            </a:prstGeom>
-          </p:spPr>
-        </p:pic>
-        <p:pic>
-          <p:nvPicPr>
-            <p:cNvPr id="3" name="Graphic 2">
-              <a:extLst>
-                <a:ext uri="{FF2B5EF4-FFF2-40B4-BE49-F238E27FC236}">
-                  <a16:creationId xmlns:a16="http://schemas.microsoft.com/office/drawing/2014/main" id="{ECBFC91F-3F11-852E-3A03-A691993AA7F2}"/>
-                </a:ext>
-              </a:extLst>
-            </p:cNvPr>
-            <p:cNvPicPr>
-              <a:picLocks noChangeAspect="1"/>
-            </p:cNvPicPr>
-            <p:nvPr/>
-          </p:nvPicPr>
-          <p:blipFill>
-            <a:blip r:embed="rId7">
-              <a:extLst>
-                <a:ext uri="{96DAC541-7B7A-43D3-8B79-37D633B846F1}">
-                  <asvg:svgBlip xmlns:asvg="http://schemas.microsoft.com/office/drawing/2016/SVG/main" r:embed="rId8"/>
-                </a:ext>
-              </a:extLst>
-            </a:blip>
-            <a:srcRect r="4743"/>
-            <a:stretch>
-              <a:fillRect/>
-            </a:stretch>
-          </p:blipFill>
-          <p:spPr>
-            <a:xfrm>
-              <a:off x="3132312" y="4936512"/>
-              <a:ext cx="36861225" cy="28069259"/>
-            </a:xfrm>
-            <a:prstGeom prst="rect">
-              <a:avLst/>
-            </a:prstGeom>
-          </p:spPr>
-        </p:pic>
-      </p:grpSp>
+          <a:prstGeom prst="rect">
+            <a:avLst/>
+          </a:prstGeom>
+        </p:spPr>
+      </p:pic>
+      <p:pic>
+        <p:nvPicPr>
+          <p:cNvPr id="185" name="Graphic 184" descr="Checkmark with solid fill">
+            <a:extLst>
+              <a:ext uri="{FF2B5EF4-FFF2-40B4-BE49-F238E27FC236}">
+                <a16:creationId xmlns:a16="http://schemas.microsoft.com/office/drawing/2014/main" id="{955E1483-6A4F-A736-18AF-934F34ACA77D}"/>
+              </a:ext>
+            </a:extLst>
+          </p:cNvPr>
+          <p:cNvPicPr>
+            <a:picLocks noChangeAspect="1"/>
+          </p:cNvPicPr>
+          <p:nvPr/>
+        </p:nvPicPr>
+        <p:blipFill>
+          <a:blip r:embed="rId5">
+            <a:extLst>
+              <a:ext uri="{96DAC541-7B7A-43D3-8B79-37D633B846F1}">
+                <asvg:svgBlip xmlns:asvg="http://schemas.microsoft.com/office/drawing/2016/SVG/main" r:embed="rId6"/>
+              </a:ext>
+            </a:extLst>
+          </a:blip>
+          <a:stretch>
+            <a:fillRect/>
+          </a:stretch>
+        </p:blipFill>
+        <p:spPr>
+          <a:xfrm>
+            <a:off x="1777793" y="12730866"/>
+            <a:ext cx="1110401" cy="1130965"/>
+          </a:xfrm>
+          <a:prstGeom prst="rect">
+            <a:avLst/>
+          </a:prstGeom>
+        </p:spPr>
+      </p:pic>
+      <p:pic>
+        <p:nvPicPr>
+          <p:cNvPr id="188" name="Graphic 187" descr="Close with solid fill">
+            <a:extLst>
+              <a:ext uri="{FF2B5EF4-FFF2-40B4-BE49-F238E27FC236}">
+                <a16:creationId xmlns:a16="http://schemas.microsoft.com/office/drawing/2014/main" id="{06EC8548-B8A5-B992-DA85-63C098AAE464}"/>
+              </a:ext>
+            </a:extLst>
+          </p:cNvPr>
+          <p:cNvPicPr>
+            <a:picLocks noChangeAspect="1"/>
+          </p:cNvPicPr>
+          <p:nvPr/>
+        </p:nvPicPr>
+        <p:blipFill>
+          <a:blip r:embed="rId7">
+            <a:extLst>
+              <a:ext uri="{96DAC541-7B7A-43D3-8B79-37D633B846F1}">
+                <asvg:svgBlip xmlns:asvg="http://schemas.microsoft.com/office/drawing/2016/SVG/main" r:embed="rId8"/>
+              </a:ext>
+            </a:extLst>
+          </a:blip>
+          <a:stretch>
+            <a:fillRect/>
+          </a:stretch>
+        </p:blipFill>
+        <p:spPr>
+          <a:xfrm>
+            <a:off x="1780313" y="11055359"/>
+            <a:ext cx="1110401" cy="1130965"/>
+          </a:xfrm>
+          <a:prstGeom prst="rect">
+            <a:avLst/>
+          </a:prstGeom>
+        </p:spPr>
+      </p:pic>
+      <p:pic>
+        <p:nvPicPr>
+          <p:cNvPr id="191" name="Graphic 190" descr="Checkmark with solid fill">
+            <a:extLst>
+              <a:ext uri="{FF2B5EF4-FFF2-40B4-BE49-F238E27FC236}">
+                <a16:creationId xmlns:a16="http://schemas.microsoft.com/office/drawing/2014/main" id="{ACFDF0B6-C7B6-7232-DFC4-D6010F8F7E7E}"/>
+              </a:ext>
+            </a:extLst>
+          </p:cNvPr>
+          <p:cNvPicPr>
+            <a:picLocks noChangeAspect="1"/>
+          </p:cNvPicPr>
+          <p:nvPr/>
+        </p:nvPicPr>
+        <p:blipFill>
+          <a:blip r:embed="rId5">
+            <a:extLst>
+              <a:ext uri="{96DAC541-7B7A-43D3-8B79-37D633B846F1}">
+                <asvg:svgBlip xmlns:asvg="http://schemas.microsoft.com/office/drawing/2016/SVG/main" r:embed="rId6"/>
+              </a:ext>
+            </a:extLst>
+          </a:blip>
+          <a:stretch>
+            <a:fillRect/>
+          </a:stretch>
+        </p:blipFill>
+        <p:spPr>
+          <a:xfrm>
+            <a:off x="1779463" y="19409595"/>
+            <a:ext cx="1110401" cy="1130965"/>
+          </a:xfrm>
+          <a:prstGeom prst="rect">
+            <a:avLst/>
+          </a:prstGeom>
+        </p:spPr>
+      </p:pic>
+      <p:pic>
+        <p:nvPicPr>
+          <p:cNvPr id="198" name="Graphic 197" descr="Checkmark with solid fill">
+            <a:extLst>
+              <a:ext uri="{FF2B5EF4-FFF2-40B4-BE49-F238E27FC236}">
+                <a16:creationId xmlns:a16="http://schemas.microsoft.com/office/drawing/2014/main" id="{FA05089F-FB98-1E0B-F4EB-6EAC614D2911}"/>
+              </a:ext>
+            </a:extLst>
+          </p:cNvPr>
+          <p:cNvPicPr>
+            <a:picLocks noChangeAspect="1"/>
+          </p:cNvPicPr>
+          <p:nvPr/>
+        </p:nvPicPr>
+        <p:blipFill>
+          <a:blip r:embed="rId5">
+            <a:extLst>
+              <a:ext uri="{96DAC541-7B7A-43D3-8B79-37D633B846F1}">
+                <asvg:svgBlip xmlns:asvg="http://schemas.microsoft.com/office/drawing/2016/SVG/main" r:embed="rId6"/>
+              </a:ext>
+            </a:extLst>
+          </a:blip>
+          <a:stretch>
+            <a:fillRect/>
+          </a:stretch>
+        </p:blipFill>
+        <p:spPr>
+          <a:xfrm>
+            <a:off x="1777793" y="22751882"/>
+            <a:ext cx="1110401" cy="1130965"/>
+          </a:xfrm>
+          <a:prstGeom prst="rect">
+            <a:avLst/>
+          </a:prstGeom>
+        </p:spPr>
+      </p:pic>
+      <p:pic>
+        <p:nvPicPr>
+          <p:cNvPr id="199" name="Graphic 198" descr="Checkmark with solid fill">
+            <a:extLst>
+              <a:ext uri="{FF2B5EF4-FFF2-40B4-BE49-F238E27FC236}">
+                <a16:creationId xmlns:a16="http://schemas.microsoft.com/office/drawing/2014/main" id="{337B4400-54C7-5802-7601-20D940EEE744}"/>
+              </a:ext>
+            </a:extLst>
+          </p:cNvPr>
+          <p:cNvPicPr>
+            <a:picLocks noChangeAspect="1"/>
+          </p:cNvPicPr>
+          <p:nvPr/>
+        </p:nvPicPr>
+        <p:blipFill>
+          <a:blip r:embed="rId5">
+            <a:extLst>
+              <a:ext uri="{96DAC541-7B7A-43D3-8B79-37D633B846F1}">
+                <asvg:svgBlip xmlns:asvg="http://schemas.microsoft.com/office/drawing/2016/SVG/main" r:embed="rId6"/>
+              </a:ext>
+            </a:extLst>
+          </a:blip>
+          <a:stretch>
+            <a:fillRect/>
+          </a:stretch>
+        </p:blipFill>
+        <p:spPr>
+          <a:xfrm>
+            <a:off x="1777954" y="16066417"/>
+            <a:ext cx="1110401" cy="1130965"/>
+          </a:xfrm>
+          <a:prstGeom prst="rect">
+            <a:avLst/>
+          </a:prstGeom>
+        </p:spPr>
+      </p:pic>
+      <p:pic>
+        <p:nvPicPr>
+          <p:cNvPr id="18" name="Graphic 17" descr="Close with solid fill">
+            <a:extLst>
+              <a:ext uri="{FF2B5EF4-FFF2-40B4-BE49-F238E27FC236}">
+                <a16:creationId xmlns:a16="http://schemas.microsoft.com/office/drawing/2014/main" id="{A625C74C-C715-3DA6-BEF9-085F607AEF22}"/>
+              </a:ext>
+            </a:extLst>
+          </p:cNvPr>
+          <p:cNvPicPr>
+            <a:picLocks noChangeAspect="1"/>
+          </p:cNvPicPr>
+          <p:nvPr/>
+        </p:nvPicPr>
+        <p:blipFill>
+          <a:blip r:embed="rId7">
+            <a:extLst>
+              <a:ext uri="{96DAC541-7B7A-43D3-8B79-37D633B846F1}">
+                <asvg:svgBlip xmlns:asvg="http://schemas.microsoft.com/office/drawing/2016/SVG/main" r:embed="rId8"/>
+              </a:ext>
+            </a:extLst>
+          </a:blip>
+          <a:stretch>
+            <a:fillRect/>
+          </a:stretch>
+        </p:blipFill>
+        <p:spPr>
+          <a:xfrm>
+            <a:off x="1779257" y="24422314"/>
+            <a:ext cx="1110401" cy="1130965"/>
+          </a:xfrm>
+          <a:prstGeom prst="rect">
+            <a:avLst/>
+          </a:prstGeom>
+        </p:spPr>
+      </p:pic>
     </p:spTree>
     <p:extLst>
       <p:ext uri="{BB962C8B-B14F-4D97-AF65-F5344CB8AC3E}">
-        <p14:creationId xmlns:p14="http://schemas.microsoft.com/office/powerpoint/2010/main" val="1513626308"/>
+        <p14:creationId xmlns:p14="http://schemas.microsoft.com/office/powerpoint/2010/main" val="4136237022"/>
       </p:ext>
     </p:extLst>
   </p:cSld>
@@ -12792,9 +12305,23 @@
 <file path=ppt/slides/slide3.xml><?xml version="1.0" encoding="utf-8"?>
 <p:sld xmlns:a="http://schemas.openxmlformats.org/drawingml/2006/main" xmlns:r="http://schemas.openxmlformats.org/officeDocument/2006/relationships" xmlns:p="http://schemas.openxmlformats.org/presentationml/2006/main">
   <p:cSld>
+    <p:bg>
+      <p:bgPr>
+        <a:solidFill>
+          <a:schemeClr val="lt1"/>
+        </a:solidFill>
+        <a:effectLst/>
+      </p:bgPr>
+    </p:bg>
     <p:spTree>
       <p:nvGrpSpPr>
-        <p:cNvPr id="1" name=""/>
+        <p:cNvPr id="1" name="Shape 88">
+          <a:extLst>
+            <a:ext uri="{FF2B5EF4-FFF2-40B4-BE49-F238E27FC236}">
+              <a16:creationId xmlns:a16="http://schemas.microsoft.com/office/drawing/2014/main" id="{F4BD593C-5B13-8C2C-F6E7-54B99C8F3981}"/>
+            </a:ext>
+          </a:extLst>
+        </p:cNvPr>
         <p:cNvGrpSpPr/>
         <p:nvPr/>
       </p:nvGrpSpPr>
@@ -12811,7 +12338,7 @@
           <p:cNvPr id="3" name="Graphic 2">
             <a:extLst>
               <a:ext uri="{FF2B5EF4-FFF2-40B4-BE49-F238E27FC236}">
-                <a16:creationId xmlns:a16="http://schemas.microsoft.com/office/drawing/2014/main" id="{4AA91E08-3059-5CD6-3148-47A2546A227C}"/>
+                <a16:creationId xmlns:a16="http://schemas.microsoft.com/office/drawing/2014/main" id="{620EEB40-CD61-1FFA-3F02-01A1E100C534}"/>
               </a:ext>
             </a:extLst>
           </p:cNvPr>
@@ -12821,22 +12348,22 @@
           <p:nvPr/>
         </p:nvPicPr>
         <p:blipFill>
-          <a:blip r:embed="rId2">
+          <a:blip r:embed="rId3">
             <a:extLst>
               <a:ext uri="{96DAC541-7B7A-43D3-8B79-37D633B846F1}">
-                <asvg:svgBlip xmlns:asvg="http://schemas.microsoft.com/office/drawing/2016/SVG/main" r:embed="rId3"/>
+                <asvg:svgBlip xmlns:asvg="http://schemas.microsoft.com/office/drawing/2016/SVG/main" r:embed="rId4"/>
               </a:ext>
             </a:extLst>
           </a:blip>
-          <a:srcRect l="1331" r="1969"/>
+          <a:srcRect l="4827" t="29554" r="4688" b="7407"/>
           <a:stretch>
             <a:fillRect/>
           </a:stretch>
         </p:blipFill>
         <p:spPr>
           <a:xfrm>
-            <a:off x="0" y="-1122630"/>
-            <a:ext cx="36576000" cy="34041030"/>
+            <a:off x="0" y="9984715"/>
+            <a:ext cx="36576000" cy="22933685"/>
           </a:xfrm>
           <a:prstGeom prst="rect">
             <a:avLst/>
@@ -12846,7 +12373,7 @@
     </p:spTree>
     <p:extLst>
       <p:ext uri="{BB962C8B-B14F-4D97-AF65-F5344CB8AC3E}">
-        <p14:creationId xmlns:p14="http://schemas.microsoft.com/office/powerpoint/2010/main" val="2663873905"/>
+        <p14:creationId xmlns:p14="http://schemas.microsoft.com/office/powerpoint/2010/main" val="2670139317"/>
       </p:ext>
     </p:extLst>
   </p:cSld>

</xml_diff>